<commit_message>
update information for LIMU-BERT
</commit_message>
<xml_diff>
--- a/files/LIMU-BERT.pptx
+++ b/files/LIMU-BERT.pptx
@@ -681,7 +681,7 @@
 <file path=ppt/charts/chart1.xml><?xml version="1.0" encoding="utf-8"?>
 <c:chartSpace xmlns:c="http://schemas.openxmlformats.org/drawingml/2006/chart" xmlns:a="http://schemas.openxmlformats.org/drawingml/2006/main" xmlns:r="http://schemas.openxmlformats.org/officeDocument/2006/relationships" xmlns:c16r2="http://schemas.microsoft.com/office/drawing/2015/06/chart">
   <c:date1904 val="0"/>
-  <c:lang val="en-US"/>
+  <c:lang val="zh-CN"/>
   <c:roundedCorners val="0"/>
   <mc:AlternateContent xmlns:mc="http://schemas.openxmlformats.org/markup-compatibility/2006">
     <mc:Choice xmlns:c14="http://schemas.microsoft.com/office/drawing/2007/8/2/chart" Requires="c14">
@@ -825,6 +825,7 @@
             </c:dLbl>
             <c:dLbl>
               <c:idx val="1"/>
+              <c:layout/>
               <c:spPr>
                 <a:noFill/>
                 <a:ln>
@@ -858,12 +859,7 @@
               <c:showBubbleSize val="0"/>
               <c:extLst>
                 <c:ext xmlns:c15="http://schemas.microsoft.com/office/drawing/2012/chart" uri="{CE6537A1-D6FC-4f65-9D91-7224C49458BB}">
-                  <c15:layout>
-                    <c:manualLayout>
-                      <c:w val="0.42684641111235161"/>
-                      <c:h val="0.23423073927931751"/>
-                    </c:manualLayout>
-                  </c15:layout>
+                  <c15:layout/>
                 </c:ext>
                 <c:ext xmlns:c16="http://schemas.microsoft.com/office/drawing/2014/chart" uri="{C3380CC4-5D6E-409C-BE32-E72D297353CC}">
                   <c16:uniqueId val="{00000004-A3BF-4830-95C3-45DF1E69FF73}"/>
@@ -979,6 +975,7 @@
     </c:plotArea>
     <c:plotVisOnly val="1"/>
     <c:dispBlanksAs val="gap"/>
+    <c:showDLblsOverMax val="0"/>
     <c:extLst>
       <c:ext xmlns:c16r3="http://schemas.microsoft.com/office/drawing/2017/03/chart" uri="{56B9EC1D-385E-4148-901F-78D8002777C0}">
         <c16r3:dataDisplayOptions16>
@@ -986,7 +983,6 @@
         </c16r3:dataDisplayOptions16>
       </c:ext>
     </c:extLst>
-    <c:showDLblsOverMax val="0"/>
   </c:chart>
   <c:spPr>
     <a:noFill/>
@@ -1652,7 +1648,7 @@
                 <a:latin typeface="Arial"/>
               </a:rPr>
               <a:pPr/>
-              <a:t>11/25/2021</a:t>
+              <a:t>12/2/2021</a:t>
             </a:fld>
             <a:endParaRPr lang="en-US">
               <a:latin typeface="Arial"/>
@@ -1827,7 +1823,7 @@
             <a:fld id="{62C75D5A-9226-4F18-87F5-E7107EB59AE0}" type="datetimeFigureOut">
               <a:rPr lang="sv-SE" smtClean="0"/>
               <a:pPr/>
-              <a:t>2021-11-25</a:t>
+              <a:t>2021-12-02</a:t>
             </a:fld>
             <a:endParaRPr lang="sv-SE"/>
           </a:p>
@@ -3834,7 +3830,7 @@
           <a:p>
             <a:fld id="{AE8AD48F-20D3-47F1-BC73-F9A0988D8CA7}" type="datetime1">
               <a:rPr lang="en-US" smtClean="0"/>
-              <a:t>11/25/2021</a:t>
+              <a:t>12/2/2021</a:t>
             </a:fld>
             <a:endParaRPr lang="en-US"/>
           </a:p>
@@ -4003,7 +3999,7 @@
           <a:p>
             <a:fld id="{0BF89A45-0ADB-4ABA-8B2D-86265AA3D8AF}" type="datetime1">
               <a:rPr lang="en-US" smtClean="0"/>
-              <a:t>11/25/2021</a:t>
+              <a:t>12/2/2021</a:t>
             </a:fld>
             <a:endParaRPr lang="en-US"/>
           </a:p>
@@ -4249,7 +4245,7 @@
           <a:p>
             <a:fld id="{322A9D0F-93FC-4B14-ABA6-44BEEBD96CFF}" type="datetime1">
               <a:rPr lang="en-US" smtClean="0"/>
-              <a:t>11/25/2021</a:t>
+              <a:t>12/2/2021</a:t>
             </a:fld>
             <a:endParaRPr lang="en-US"/>
           </a:p>
@@ -4535,7 +4531,7 @@
           <a:p>
             <a:fld id="{0E0C0C22-71FB-4E1B-9869-143E9281DE07}" type="datetime1">
               <a:rPr lang="en-US" smtClean="0"/>
-              <a:t>11/25/2021</a:t>
+              <a:t>12/2/2021</a:t>
             </a:fld>
             <a:endParaRPr lang="en-US"/>
           </a:p>
@@ -4955,7 +4951,7 @@
           <a:p>
             <a:fld id="{403AD78F-7E02-449B-A64B-A1AA6108BA33}" type="datetime1">
               <a:rPr lang="en-US" smtClean="0"/>
-              <a:t>11/25/2021</a:t>
+              <a:t>12/2/2021</a:t>
             </a:fld>
             <a:endParaRPr lang="en-US"/>
           </a:p>
@@ -5073,7 +5069,7 @@
           <a:p>
             <a:fld id="{57BCC7C3-EA0F-4332-A8F6-819276CFAA99}" type="datetime1">
               <a:rPr lang="en-US" smtClean="0"/>
-              <a:t>11/25/2021</a:t>
+              <a:t>12/2/2021</a:t>
             </a:fld>
             <a:endParaRPr lang="en-US"/>
           </a:p>
@@ -5169,7 +5165,7 @@
           <a:p>
             <a:fld id="{7F929583-44DA-4491-9BA7-0F74FE2C202F}" type="datetime1">
               <a:rPr lang="en-US" smtClean="0"/>
-              <a:t>11/25/2021</a:t>
+              <a:t>12/2/2021</a:t>
             </a:fld>
             <a:endParaRPr lang="en-US"/>
           </a:p>
@@ -5445,7 +5441,7 @@
           <a:p>
             <a:fld id="{F2B2A28E-CF80-4AA7-A19B-2D59C7F7237F}" type="datetime1">
               <a:rPr lang="en-US" smtClean="0"/>
-              <a:t>11/25/2021</a:t>
+              <a:t>12/2/2021</a:t>
             </a:fld>
             <a:endParaRPr lang="en-US"/>
           </a:p>
@@ -5698,7 +5694,7 @@
           <a:p>
             <a:fld id="{A592F87D-EBC7-41E3-9334-2F449DD10ED7}" type="datetime1">
               <a:rPr lang="en-US" smtClean="0"/>
-              <a:t>11/25/2021</a:t>
+              <a:t>12/2/2021</a:t>
             </a:fld>
             <a:endParaRPr lang="en-US"/>
           </a:p>
@@ -5911,7 +5907,7 @@
           <a:p>
             <a:fld id="{26D34841-2ED5-409F-B2BE-304C2DA5D90A}" type="datetime1">
               <a:rPr lang="en-US" smtClean="0"/>
-              <a:t>11/25/2021</a:t>
+              <a:t>12/2/2021</a:t>
             </a:fld>
             <a:endParaRPr lang="en-US"/>
           </a:p>
@@ -6643,6 +6639,13 @@
   <p:clrMapOvr>
     <a:masterClrMapping/>
   </p:clrMapOvr>
+  <p:timing>
+    <p:tnLst>
+      <p:par>
+        <p:cTn id="1" dur="indefinite" restart="never" nodeType="tmRoot"/>
+      </p:par>
+    </p:tnLst>
+  </p:timing>
 </p:sld>
 </file>
 
@@ -7063,6 +7066,13 @@
   <p:clrMapOvr>
     <a:masterClrMapping/>
   </p:clrMapOvr>
+  <p:timing>
+    <p:tnLst>
+      <p:par>
+        <p:cTn id="1" dur="indefinite" restart="never" nodeType="tmRoot"/>
+      </p:par>
+    </p:tnLst>
+  </p:timing>
 </p:sld>
 </file>
 
@@ -10484,6 +10494,13 @@
   <p:clrMapOvr>
     <a:masterClrMapping/>
   </p:clrMapOvr>
+  <p:timing>
+    <p:tnLst>
+      <p:par>
+        <p:cTn id="1" dur="indefinite" restart="never" nodeType="tmRoot"/>
+      </p:par>
+    </p:tnLst>
+  </p:timing>
 </p:sld>
 </file>
 
@@ -11784,6 +11801,13 @@
   <p:clrMapOvr>
     <a:masterClrMapping/>
   </p:clrMapOvr>
+  <p:timing>
+    <p:tnLst>
+      <p:par>
+        <p:cTn id="1" dur="indefinite" restart="never" nodeType="tmRoot"/>
+      </p:par>
+    </p:tnLst>
+  </p:timing>
 </p:sld>
 </file>
 
@@ -22519,6 +22543,13 @@
   <p:clrMapOvr>
     <a:masterClrMapping/>
   </p:clrMapOvr>
+  <p:timing>
+    <p:tnLst>
+      <p:par>
+        <p:cTn id="1" dur="indefinite" restart="never" nodeType="tmRoot"/>
+      </p:par>
+    </p:tnLst>
+  </p:timing>
 </p:sld>
 </file>
 
@@ -22838,8 +22869,8 @@
         </p:nvSpPr>
         <p:spPr>
           <a:xfrm>
-            <a:off x="1343608" y="2963805"/>
-            <a:ext cx="265922" cy="714897"/>
+            <a:off x="1343608" y="2963806"/>
+            <a:ext cx="265922" cy="538152"/>
           </a:xfrm>
           <a:prstGeom prst="rect">
             <a:avLst/>
@@ -23585,6 +23616,13 @@
   <p:clrMapOvr>
     <a:masterClrMapping/>
   </p:clrMapOvr>
+  <p:timing>
+    <p:tnLst>
+      <p:par>
+        <p:cTn id="1" dur="indefinite" restart="never" nodeType="tmRoot"/>
+      </p:par>
+    </p:tnLst>
+  </p:timing>
 </p:sld>
 </file>
 
@@ -24466,6 +24504,13 @@
   <p:clrMapOvr>
     <a:masterClrMapping/>
   </p:clrMapOvr>
+  <p:timing>
+    <p:tnLst>
+      <p:par>
+        <p:cTn id="1" dur="indefinite" restart="never" nodeType="tmRoot"/>
+      </p:par>
+    </p:tnLst>
+  </p:timing>
 </p:sld>
 </file>
 
@@ -26474,6 +26519,13 @@
   <p:clrMapOvr>
     <a:masterClrMapping/>
   </p:clrMapOvr>
+  <p:timing>
+    <p:tnLst>
+      <p:par>
+        <p:cTn id="1" dur="indefinite" restart="never" nodeType="tmRoot"/>
+      </p:par>
+    </p:tnLst>
+  </p:timing>
 </p:sld>
 </file>
 
@@ -31413,6 +31465,13 @@
   <p:clrMapOvr>
     <a:masterClrMapping/>
   </p:clrMapOvr>
+  <p:timing>
+    <p:tnLst>
+      <p:par>
+        <p:cTn id="1" dur="indefinite" restart="never" nodeType="tmRoot"/>
+      </p:par>
+    </p:tnLst>
+  </p:timing>
 </p:sld>
 </file>
 
@@ -32496,7 +32555,7 @@
           <p:nvPr>
             <p:extLst>
               <p:ext uri="{D42A27DB-BD31-4B8C-83A1-F6EECF244321}">
-                <p14:modId xmlns:p14="http://schemas.microsoft.com/office/powerpoint/2010/main" val="2529704106"/>
+                <p14:modId xmlns:p14="http://schemas.microsoft.com/office/powerpoint/2010/main" val="2408781706"/>
               </p:ext>
             </p:extLst>
           </p:nvPr>
@@ -32632,8 +32691,8 @@
                     <a:lstStyle/>
                     <a:p>
                       <a:r>
-                        <a:rPr lang="en-US" altLang="zh-CN" sz="1600" dirty="0"/>
-                        <a:t>sample</a:t>
+                        <a:rPr lang="en-US" altLang="zh-CN" sz="1600" dirty="0" smtClean="0"/>
+                        <a:t>Sample #</a:t>
                       </a:r>
                       <a:endParaRPr lang="zh-CN" altLang="en-US" sz="1600" dirty="0"/>
                     </a:p>
@@ -33024,6 +33083,13 @@
   <p:clrMapOvr>
     <a:masterClrMapping/>
   </p:clrMapOvr>
+  <p:timing>
+    <p:tnLst>
+      <p:par>
+        <p:cTn id="1" dur="indefinite" restart="never" nodeType="tmRoot"/>
+      </p:par>
+    </p:tnLst>
+  </p:timing>
 </p:sld>
 </file>
 
@@ -33236,6 +33302,13 @@
   <p:clrMapOvr>
     <a:masterClrMapping/>
   </p:clrMapOvr>
+  <p:timing>
+    <p:tnLst>
+      <p:par>
+        <p:cTn id="1" dur="indefinite" restart="never" nodeType="tmRoot"/>
+      </p:par>
+    </p:tnLst>
+  </p:timing>
 </p:sld>
 </file>
 
@@ -34236,6 +34309,13 @@
   <p:clrMapOvr>
     <a:masterClrMapping/>
   </p:clrMapOvr>
+  <p:timing>
+    <p:tnLst>
+      <p:par>
+        <p:cTn id="1" dur="indefinite" restart="never" nodeType="tmRoot"/>
+      </p:par>
+    </p:tnLst>
+  </p:timing>
 </p:sld>
 </file>
 
@@ -34390,6 +34470,13 @@
   <p:clrMapOvr>
     <a:masterClrMapping/>
   </p:clrMapOvr>
+  <p:timing>
+    <p:tnLst>
+      <p:par>
+        <p:cTn id="1" dur="indefinite" restart="never" nodeType="tmRoot"/>
+      </p:par>
+    </p:tnLst>
+  </p:timing>
 </p:sld>
 </file>
 
@@ -34567,6 +34654,13 @@
   <p:clrMapOvr>
     <a:masterClrMapping/>
   </p:clrMapOvr>
+  <p:timing>
+    <p:tnLst>
+      <p:par>
+        <p:cTn id="1" dur="indefinite" restart="never" nodeType="tmRoot"/>
+      </p:par>
+    </p:tnLst>
+  </p:timing>
 </p:sld>
 </file>
 
@@ -34861,6 +34955,13 @@
       <p:transition spd="slow" advTm="24416"/>
     </mc:Fallback>
   </mc:AlternateContent>
+  <p:timing>
+    <p:tnLst>
+      <p:par>
+        <p:cTn id="1" dur="indefinite" restart="never" nodeType="tmRoot"/>
+      </p:par>
+    </p:tnLst>
+  </p:timing>
 </p:sld>
 </file>
 
@@ -35104,6 +35205,13 @@
       <p:transition spd="slow" advTm="24416"/>
     </mc:Fallback>
   </mc:AlternateContent>
+  <p:timing>
+    <p:tnLst>
+      <p:par>
+        <p:cTn id="1" dur="indefinite" restart="never" nodeType="tmRoot"/>
+      </p:par>
+    </p:tnLst>
+  </p:timing>
 </p:sld>
 </file>
 
@@ -35247,6 +35355,13 @@
   <p:clrMapOvr>
     <a:masterClrMapping/>
   </p:clrMapOvr>
+  <p:timing>
+    <p:tnLst>
+      <p:par>
+        <p:cTn id="1" dur="indefinite" restart="never" nodeType="tmRoot"/>
+      </p:par>
+    </p:tnLst>
+  </p:timing>
 </p:sld>
 </file>
 
@@ -38258,6 +38373,13 @@
   <p:clrMapOvr>
     <a:masterClrMapping/>
   </p:clrMapOvr>
+  <p:timing>
+    <p:tnLst>
+      <p:par>
+        <p:cTn id="1" dur="indefinite" restart="never" nodeType="tmRoot"/>
+      </p:par>
+    </p:tnLst>
+  </p:timing>
 </p:sld>
 </file>
 
@@ -44351,11 +44473,12 @@
             </a:pPr>
             <a:r>
               <a:rPr lang="en-US" sz="2000" b="1" dirty="0"/>
-              <a:t>Self-supervised learning methods: pre-training</a:t>
-            </a:r>
-            <a:endParaRPr lang="en-US" sz="1600" dirty="0"/>
-          </a:p>
-          <a:p>
+              <a:t>Self-supervised learning methods</a:t>
+            </a:r>
+            <a:r>
+              <a:rPr lang="en-US" sz="2000" b="1" dirty="0" smtClean="0"/>
+              <a:t>:</a:t>
+            </a:r>
             <a:endParaRPr lang="en-US" sz="1600" dirty="0"/>
           </a:p>
           <a:p>
@@ -44577,6 +44700,13 @@
   <p:clrMapOvr>
     <a:masterClrMapping/>
   </p:clrMapOvr>
+  <p:timing>
+    <p:tnLst>
+      <p:par>
+        <p:cTn id="1" dur="indefinite" restart="never" nodeType="tmRoot"/>
+      </p:par>
+    </p:tnLst>
+  </p:timing>
 </p:sld>
 </file>
 
@@ -45315,7 +45445,7 @@
         <p:spPr>
           <a:xfrm>
             <a:off x="1981200" y="3346680"/>
-            <a:ext cx="2969419" cy="338554"/>
+            <a:ext cx="2969419" cy="584775"/>
           </a:xfrm>
           <a:prstGeom prst="rect">
             <a:avLst/>
@@ -45329,9 +45459,16 @@
           <a:lstStyle/>
           <a:p>
             <a:r>
+              <a:rPr lang="en-US" altLang="zh-CN" sz="1600" dirty="0" smtClean="0"/>
+              <a:t>Memory-based </a:t>
+            </a:r>
+            <a:r>
               <a:rPr lang="en-US" altLang="zh-CN" sz="1600" dirty="0"/>
-              <a:t>Attention</a:t>
-            </a:r>
+              <a:t>networks</a:t>
+            </a:r>
+            <a:endParaRPr lang="zh-CN" altLang="en-US" sz="1600" dirty="0"/>
+          </a:p>
+          <a:p>
             <a:endParaRPr lang="zh-CN" altLang="en-US" sz="1600" dirty="0"/>
           </a:p>
         </p:txBody>
@@ -45365,8 +45502,8 @@
           <a:lstStyle/>
           <a:p>
             <a:r>
-              <a:rPr lang="en-US" altLang="zh-CN" sz="1600" dirty="0"/>
-              <a:t>Memory-based networks</a:t>
+              <a:rPr lang="en-US" altLang="zh-CN" sz="1600"/>
+              <a:t>Attention</a:t>
             </a:r>
             <a:endParaRPr lang="zh-CN" altLang="en-US" sz="1600" dirty="0"/>
           </a:p>
@@ -45653,8 +45790,8 @@
           <a:lstStyle/>
           <a:p>
             <a:r>
-              <a:rPr lang="en-US" altLang="zh-CN" sz="1600" dirty="0"/>
-              <a:t>2015</a:t>
+              <a:rPr lang="en-US" altLang="zh-CN" sz="1600" dirty="0" smtClean="0"/>
+              <a:t>2017</a:t>
             </a:r>
             <a:endParaRPr lang="zh-CN" altLang="en-US" sz="1600" dirty="0"/>
           </a:p>
@@ -45706,6 +45843,13 @@
   <p:clrMapOvr>
     <a:masterClrMapping/>
   </p:clrMapOvr>
+  <p:timing>
+    <p:tnLst>
+      <p:par>
+        <p:cTn id="1" dur="indefinite" restart="never" nodeType="tmRoot"/>
+      </p:par>
+    </p:tnLst>
+  </p:timing>
 </p:sld>
 </file>
 
@@ -45783,9 +45927,95 @@
           </a:p>
         </p:txBody>
       </p:sp>
+      <p:sp>
+        <p:nvSpPr>
+          <p:cNvPr id="35" name="Arrow: Left 34">
+            <a:extLst>
+              <a:ext uri="{FF2B5EF4-FFF2-40B4-BE49-F238E27FC236}">
+                <a16:creationId xmlns:a16="http://schemas.microsoft.com/office/drawing/2014/main" id="{5FA51470-6B85-4A61-9743-C7A1608245E6}"/>
+              </a:ext>
+            </a:extLst>
+          </p:cNvPr>
+          <p:cNvSpPr/>
+          <p:nvPr/>
+        </p:nvSpPr>
+        <p:spPr>
+          <a:xfrm>
+            <a:off x="4877990" y="2800649"/>
+            <a:ext cx="873919" cy="432876"/>
+          </a:xfrm>
+          <a:prstGeom prst="leftArrow">
+            <a:avLst/>
+          </a:prstGeom>
+          <a:solidFill>
+            <a:srgbClr val="C00000"/>
+          </a:solidFill>
+          <a:ln>
+            <a:noFill/>
+          </a:ln>
+        </p:spPr>
+        <p:style>
+          <a:lnRef idx="1">
+            <a:schemeClr val="accent1"/>
+          </a:lnRef>
+          <a:fillRef idx="3">
+            <a:schemeClr val="accent1"/>
+          </a:fillRef>
+          <a:effectRef idx="2">
+            <a:schemeClr val="accent1"/>
+          </a:effectRef>
+          <a:fontRef idx="minor">
+            <a:schemeClr val="lt1"/>
+          </a:fontRef>
+        </p:style>
+        <p:txBody>
+          <a:bodyPr rtlCol="0" anchor="ctr"/>
+          <a:lstStyle/>
+          <a:p>
+            <a:pPr algn="ctr"/>
+            <a:endParaRPr lang="zh-CN" altLang="en-US"/>
+          </a:p>
+        </p:txBody>
+      </p:sp>
+      <p:sp>
+        <p:nvSpPr>
+          <p:cNvPr id="36" name="TextBox 35">
+            <a:extLst>
+              <a:ext uri="{FF2B5EF4-FFF2-40B4-BE49-F238E27FC236}">
+                <a16:creationId xmlns:a16="http://schemas.microsoft.com/office/drawing/2014/main" id="{AF8542DA-2D8F-4C05-A0E0-864B5601A35D}"/>
+              </a:ext>
+            </a:extLst>
+          </p:cNvPr>
+          <p:cNvSpPr txBox="1"/>
+          <p:nvPr/>
+        </p:nvSpPr>
+        <p:spPr>
+          <a:xfrm>
+            <a:off x="5860254" y="2841834"/>
+            <a:ext cx="1547815" cy="338554"/>
+          </a:xfrm>
+          <a:prstGeom prst="rect">
+            <a:avLst/>
+          </a:prstGeom>
+          <a:noFill/>
+        </p:spPr>
+        <p:txBody>
+          <a:bodyPr wrap="square">
+            <a:spAutoFit/>
+          </a:bodyPr>
+          <a:lstStyle/>
+          <a:p>
+            <a:r>
+              <a:rPr lang="en-US" altLang="zh-CN" sz="1600" dirty="0"/>
+              <a:t>IMU sensing</a:t>
+            </a:r>
+            <a:endParaRPr lang="zh-CN" altLang="en-US" sz="1600" dirty="0"/>
+          </a:p>
+        </p:txBody>
+      </p:sp>
       <p:cxnSp>
         <p:nvCxnSpPr>
-          <p:cNvPr id="5" name="Straight Connector 4">
+          <p:cNvPr id="62" name="Straight Connector 4">
             <a:extLst>
               <a:ext uri="{FF2B5EF4-FFF2-40B4-BE49-F238E27FC236}">
                 <a16:creationId xmlns:a16="http://schemas.microsoft.com/office/drawing/2014/main" id="{8AD90B34-C1FB-4F26-B9D4-94703C65F123}"/>
@@ -45827,7 +46057,7 @@
       </p:cxnSp>
       <p:sp>
         <p:nvSpPr>
-          <p:cNvPr id="7" name="Oval 6">
+          <p:cNvPr id="63" name="Oval 6">
             <a:extLst>
               <a:ext uri="{FF2B5EF4-FFF2-40B4-BE49-F238E27FC236}">
                 <a16:creationId xmlns:a16="http://schemas.microsoft.com/office/drawing/2014/main" id="{3446D5B4-F3E3-4BD3-8D57-850EFD609651}"/>
@@ -45880,7 +46110,7 @@
       </p:sp>
       <p:sp>
         <p:nvSpPr>
-          <p:cNvPr id="11" name="Oval 10">
+          <p:cNvPr id="64" name="Oval 10">
             <a:extLst>
               <a:ext uri="{FF2B5EF4-FFF2-40B4-BE49-F238E27FC236}">
                 <a16:creationId xmlns:a16="http://schemas.microsoft.com/office/drawing/2014/main" id="{4A2013AE-2A02-4CB3-B6BA-0DB97F8A03F0}"/>
@@ -45933,7 +46163,7 @@
       </p:sp>
       <p:sp>
         <p:nvSpPr>
-          <p:cNvPr id="12" name="Oval 11">
+          <p:cNvPr id="65" name="Oval 11">
             <a:extLst>
               <a:ext uri="{FF2B5EF4-FFF2-40B4-BE49-F238E27FC236}">
                 <a16:creationId xmlns:a16="http://schemas.microsoft.com/office/drawing/2014/main" id="{477DD680-3425-4155-BE89-D2512FEEABE5}"/>
@@ -45986,7 +46216,7 @@
       </p:sp>
       <p:sp>
         <p:nvSpPr>
-          <p:cNvPr id="14" name="Oval 13">
+          <p:cNvPr id="66" name="Oval 13">
             <a:extLst>
               <a:ext uri="{FF2B5EF4-FFF2-40B4-BE49-F238E27FC236}">
                 <a16:creationId xmlns:a16="http://schemas.microsoft.com/office/drawing/2014/main" id="{ED77062E-915A-4FFE-9C5F-D9E93AAF0E20}"/>
@@ -46039,7 +46269,7 @@
       </p:sp>
       <p:sp>
         <p:nvSpPr>
-          <p:cNvPr id="15" name="Oval 14">
+          <p:cNvPr id="67" name="Oval 14">
             <a:extLst>
               <a:ext uri="{FF2B5EF4-FFF2-40B4-BE49-F238E27FC236}">
                 <a16:creationId xmlns:a16="http://schemas.microsoft.com/office/drawing/2014/main" id="{8ABAD8CC-DF4A-40C8-9F88-35AF17053828}"/>
@@ -46092,7 +46322,7 @@
       </p:sp>
       <p:sp>
         <p:nvSpPr>
-          <p:cNvPr id="16" name="Oval 15">
+          <p:cNvPr id="68" name="Oval 15">
             <a:extLst>
               <a:ext uri="{FF2B5EF4-FFF2-40B4-BE49-F238E27FC236}">
                 <a16:creationId xmlns:a16="http://schemas.microsoft.com/office/drawing/2014/main" id="{743C11A8-28CA-4B66-BF55-72036E561A09}"/>
@@ -46145,7 +46375,7 @@
       </p:sp>
       <p:sp>
         <p:nvSpPr>
-          <p:cNvPr id="17" name="Oval 16">
+          <p:cNvPr id="69" name="Oval 16">
             <a:extLst>
               <a:ext uri="{FF2B5EF4-FFF2-40B4-BE49-F238E27FC236}">
                 <a16:creationId xmlns:a16="http://schemas.microsoft.com/office/drawing/2014/main" id="{8AAD5B3D-A025-421B-9C4C-EB41D44F37E8}"/>
@@ -46198,7 +46428,7 @@
       </p:sp>
       <p:sp>
         <p:nvSpPr>
-          <p:cNvPr id="18" name="Oval 17">
+          <p:cNvPr id="70" name="Oval 17">
             <a:extLst>
               <a:ext uri="{FF2B5EF4-FFF2-40B4-BE49-F238E27FC236}">
                 <a16:creationId xmlns:a16="http://schemas.microsoft.com/office/drawing/2014/main" id="{1E60ED86-49B4-46DE-BE1E-EAA85615EBD5}"/>
@@ -46251,7 +46481,7 @@
       </p:sp>
       <p:sp>
         <p:nvSpPr>
-          <p:cNvPr id="19" name="TextBox 18">
+          <p:cNvPr id="71" name="TextBox 18">
             <a:extLst>
               <a:ext uri="{FF2B5EF4-FFF2-40B4-BE49-F238E27FC236}">
                 <a16:creationId xmlns:a16="http://schemas.microsoft.com/office/drawing/2014/main" id="{956690BA-2D16-41AD-B142-1F34455FC4DD}"/>
@@ -46287,7 +46517,7 @@
       </p:sp>
       <p:sp>
         <p:nvSpPr>
-          <p:cNvPr id="20" name="TextBox 19">
+          <p:cNvPr id="72" name="TextBox 19">
             <a:extLst>
               <a:ext uri="{FF2B5EF4-FFF2-40B4-BE49-F238E27FC236}">
                 <a16:creationId xmlns:a16="http://schemas.microsoft.com/office/drawing/2014/main" id="{53DF2CEA-2134-442B-B89F-E0F5A443DFBC}"/>
@@ -46323,7 +46553,7 @@
       </p:sp>
       <p:sp>
         <p:nvSpPr>
-          <p:cNvPr id="21" name="TextBox 20">
+          <p:cNvPr id="73" name="TextBox 20">
             <a:extLst>
               <a:ext uri="{FF2B5EF4-FFF2-40B4-BE49-F238E27FC236}">
                 <a16:creationId xmlns:a16="http://schemas.microsoft.com/office/drawing/2014/main" id="{C3A675F7-0329-4D37-9FE1-325135D1B4F2}"/>
@@ -46359,7 +46589,7 @@
       </p:sp>
       <p:sp>
         <p:nvSpPr>
-          <p:cNvPr id="22" name="TextBox 21">
+          <p:cNvPr id="74" name="TextBox 21">
             <a:extLst>
               <a:ext uri="{FF2B5EF4-FFF2-40B4-BE49-F238E27FC236}">
                 <a16:creationId xmlns:a16="http://schemas.microsoft.com/office/drawing/2014/main" id="{E2B8DC11-1EDF-4780-AF19-AA6A65021A1B}"/>
@@ -46395,7 +46625,7 @@
       </p:sp>
       <p:sp>
         <p:nvSpPr>
-          <p:cNvPr id="23" name="TextBox 22">
+          <p:cNvPr id="75" name="TextBox 22">
             <a:extLst>
               <a:ext uri="{FF2B5EF4-FFF2-40B4-BE49-F238E27FC236}">
                 <a16:creationId xmlns:a16="http://schemas.microsoft.com/office/drawing/2014/main" id="{A281806C-0FAB-4CAB-BDCA-8A8AB5FA13BE}"/>
@@ -46431,7 +46661,7 @@
       </p:sp>
       <p:sp>
         <p:nvSpPr>
-          <p:cNvPr id="24" name="TextBox 23">
+          <p:cNvPr id="76" name="TextBox 23">
             <a:extLst>
               <a:ext uri="{FF2B5EF4-FFF2-40B4-BE49-F238E27FC236}">
                 <a16:creationId xmlns:a16="http://schemas.microsoft.com/office/drawing/2014/main" id="{4848F40A-7995-4F5E-A9EC-6C4086CAFA6D}"/>
@@ -46444,7 +46674,7 @@
         <p:spPr>
           <a:xfrm>
             <a:off x="1981200" y="3346680"/>
-            <a:ext cx="2969419" cy="338554"/>
+            <a:ext cx="2969419" cy="584775"/>
           </a:xfrm>
           <a:prstGeom prst="rect">
             <a:avLst/>
@@ -46458,16 +46688,23 @@
           <a:lstStyle/>
           <a:p>
             <a:r>
+              <a:rPr lang="en-US" altLang="zh-CN" sz="1600" dirty="0" smtClean="0"/>
+              <a:t>Memory-based </a:t>
+            </a:r>
+            <a:r>
               <a:rPr lang="en-US" altLang="zh-CN" sz="1600" dirty="0"/>
-              <a:t>Attention</a:t>
+              <a:t>networks</a:t>
             </a:r>
             <a:endParaRPr lang="zh-CN" altLang="en-US" sz="1600" dirty="0"/>
           </a:p>
-        </p:txBody>
-      </p:sp>
-      <p:sp>
-        <p:nvSpPr>
-          <p:cNvPr id="25" name="TextBox 24">
+          <a:p>
+            <a:endParaRPr lang="zh-CN" altLang="en-US" sz="1600" dirty="0"/>
+          </a:p>
+        </p:txBody>
+      </p:sp>
+      <p:sp>
+        <p:nvSpPr>
+          <p:cNvPr id="77" name="TextBox 24">
             <a:extLst>
               <a:ext uri="{FF2B5EF4-FFF2-40B4-BE49-F238E27FC236}">
                 <a16:creationId xmlns:a16="http://schemas.microsoft.com/office/drawing/2014/main" id="{48F6D9E0-9D9B-42BE-A2C4-E4EA74EBB641}"/>
@@ -46494,8 +46731,8 @@
           <a:lstStyle/>
           <a:p>
             <a:r>
-              <a:rPr lang="en-US" altLang="zh-CN" sz="1600" dirty="0"/>
-              <a:t>Memory-based networks</a:t>
+              <a:rPr lang="en-US" altLang="zh-CN" sz="1600"/>
+              <a:t>Attention</a:t>
             </a:r>
             <a:endParaRPr lang="zh-CN" altLang="en-US" sz="1600" dirty="0"/>
           </a:p>
@@ -46503,7 +46740,7 @@
       </p:sp>
       <p:sp>
         <p:nvSpPr>
-          <p:cNvPr id="26" name="TextBox 25">
+          <p:cNvPr id="78" name="TextBox 25">
             <a:extLst>
               <a:ext uri="{FF2B5EF4-FFF2-40B4-BE49-F238E27FC236}">
                 <a16:creationId xmlns:a16="http://schemas.microsoft.com/office/drawing/2014/main" id="{8BEBA4A8-23EE-45C9-9C1F-A72064F2E3B7}"/>
@@ -46515,8 +46752,8 @@
         </p:nvSpPr>
         <p:spPr>
           <a:xfrm>
-            <a:off x="1981201" y="4033396"/>
-            <a:ext cx="3326606" cy="338554"/>
+            <a:off x="1981200" y="4033396"/>
+            <a:ext cx="2969419" cy="338554"/>
           </a:xfrm>
           <a:prstGeom prst="rect">
             <a:avLst/>
@@ -46539,7 +46776,7 @@
       </p:sp>
       <p:sp>
         <p:nvSpPr>
-          <p:cNvPr id="27" name="TextBox 26">
+          <p:cNvPr id="79" name="TextBox 26">
             <a:extLst>
               <a:ext uri="{FF2B5EF4-FFF2-40B4-BE49-F238E27FC236}">
                 <a16:creationId xmlns:a16="http://schemas.microsoft.com/office/drawing/2014/main" id="{C423B5D6-4ECF-4B26-85D4-7C4EEE130E21}"/>
@@ -46575,7 +46812,7 @@
       </p:sp>
       <p:sp>
         <p:nvSpPr>
-          <p:cNvPr id="28" name="TextBox 27">
+          <p:cNvPr id="80" name="TextBox 27">
             <a:extLst>
               <a:ext uri="{FF2B5EF4-FFF2-40B4-BE49-F238E27FC236}">
                 <a16:creationId xmlns:a16="http://schemas.microsoft.com/office/drawing/2014/main" id="{7058102E-2579-47AF-BCD3-7126CAB49406}"/>
@@ -46611,7 +46848,7 @@
       </p:sp>
       <p:sp>
         <p:nvSpPr>
-          <p:cNvPr id="29" name="TextBox 28">
+          <p:cNvPr id="81" name="TextBox 28">
             <a:extLst>
               <a:ext uri="{FF2B5EF4-FFF2-40B4-BE49-F238E27FC236}">
                 <a16:creationId xmlns:a16="http://schemas.microsoft.com/office/drawing/2014/main" id="{B93164C4-AB7A-4E99-948C-09A091953E82}"/>
@@ -46647,7 +46884,7 @@
       </p:sp>
       <p:sp>
         <p:nvSpPr>
-          <p:cNvPr id="30" name="TextBox 29">
+          <p:cNvPr id="82" name="TextBox 29">
             <a:extLst>
               <a:ext uri="{FF2B5EF4-FFF2-40B4-BE49-F238E27FC236}">
                 <a16:creationId xmlns:a16="http://schemas.microsoft.com/office/drawing/2014/main" id="{64769F02-92DA-4A88-80F9-217D8AE2BDCB}"/>
@@ -46683,7 +46920,7 @@
       </p:sp>
       <p:sp>
         <p:nvSpPr>
-          <p:cNvPr id="31" name="TextBox 30">
+          <p:cNvPr id="83" name="TextBox 30">
             <a:extLst>
               <a:ext uri="{FF2B5EF4-FFF2-40B4-BE49-F238E27FC236}">
                 <a16:creationId xmlns:a16="http://schemas.microsoft.com/office/drawing/2014/main" id="{8C155FDC-D571-4837-9B74-C71C1EC51D4F}"/>
@@ -46719,7 +46956,7 @@
       </p:sp>
       <p:sp>
         <p:nvSpPr>
-          <p:cNvPr id="32" name="TextBox 31">
+          <p:cNvPr id="84" name="TextBox 31">
             <a:extLst>
               <a:ext uri="{FF2B5EF4-FFF2-40B4-BE49-F238E27FC236}">
                 <a16:creationId xmlns:a16="http://schemas.microsoft.com/office/drawing/2014/main" id="{4C650DA5-7655-4416-81B7-4715AC491D45}"/>
@@ -46755,7 +46992,7 @@
       </p:sp>
       <p:sp>
         <p:nvSpPr>
-          <p:cNvPr id="33" name="TextBox 32">
+          <p:cNvPr id="85" name="TextBox 32">
             <a:extLst>
               <a:ext uri="{FF2B5EF4-FFF2-40B4-BE49-F238E27FC236}">
                 <a16:creationId xmlns:a16="http://schemas.microsoft.com/office/drawing/2014/main" id="{A216150C-2A43-4CCA-8244-D1FEBFEE5D10}"/>
@@ -46782,8 +47019,8 @@
           <a:lstStyle/>
           <a:p>
             <a:r>
-              <a:rPr lang="en-US" altLang="zh-CN" sz="1600" dirty="0"/>
-              <a:t>2015</a:t>
+              <a:rPr lang="en-US" altLang="zh-CN" sz="1600" dirty="0" smtClean="0"/>
+              <a:t>2017</a:t>
             </a:r>
             <a:endParaRPr lang="zh-CN" altLang="en-US" sz="1600" dirty="0"/>
           </a:p>
@@ -46791,7 +47028,7 @@
       </p:sp>
       <p:sp>
         <p:nvSpPr>
-          <p:cNvPr id="34" name="TextBox 33">
+          <p:cNvPr id="86" name="TextBox 33">
             <a:extLst>
               <a:ext uri="{FF2B5EF4-FFF2-40B4-BE49-F238E27FC236}">
                 <a16:creationId xmlns:a16="http://schemas.microsoft.com/office/drawing/2014/main" id="{9474C32C-D486-497C-A082-7318FB9B0D06}"/>
@@ -46820,92 +47057,6 @@
             <a:r>
               <a:rPr lang="en-US" altLang="zh-CN" sz="1600" dirty="0"/>
               <a:t>2018</a:t>
-            </a:r>
-            <a:endParaRPr lang="zh-CN" altLang="en-US" sz="1600" dirty="0"/>
-          </a:p>
-        </p:txBody>
-      </p:sp>
-      <p:sp>
-        <p:nvSpPr>
-          <p:cNvPr id="35" name="Arrow: Left 34">
-            <a:extLst>
-              <a:ext uri="{FF2B5EF4-FFF2-40B4-BE49-F238E27FC236}">
-                <a16:creationId xmlns:a16="http://schemas.microsoft.com/office/drawing/2014/main" id="{5FA51470-6B85-4A61-9743-C7A1608245E6}"/>
-              </a:ext>
-            </a:extLst>
-          </p:cNvPr>
-          <p:cNvSpPr/>
-          <p:nvPr/>
-        </p:nvSpPr>
-        <p:spPr>
-          <a:xfrm>
-            <a:off x="4877990" y="2800649"/>
-            <a:ext cx="873919" cy="432876"/>
-          </a:xfrm>
-          <a:prstGeom prst="leftArrow">
-            <a:avLst/>
-          </a:prstGeom>
-          <a:solidFill>
-            <a:srgbClr val="C00000"/>
-          </a:solidFill>
-          <a:ln>
-            <a:noFill/>
-          </a:ln>
-        </p:spPr>
-        <p:style>
-          <a:lnRef idx="1">
-            <a:schemeClr val="accent1"/>
-          </a:lnRef>
-          <a:fillRef idx="3">
-            <a:schemeClr val="accent1"/>
-          </a:fillRef>
-          <a:effectRef idx="2">
-            <a:schemeClr val="accent1"/>
-          </a:effectRef>
-          <a:fontRef idx="minor">
-            <a:schemeClr val="lt1"/>
-          </a:fontRef>
-        </p:style>
-        <p:txBody>
-          <a:bodyPr rtlCol="0" anchor="ctr"/>
-          <a:lstStyle/>
-          <a:p>
-            <a:pPr algn="ctr"/>
-            <a:endParaRPr lang="zh-CN" altLang="en-US"/>
-          </a:p>
-        </p:txBody>
-      </p:sp>
-      <p:sp>
-        <p:nvSpPr>
-          <p:cNvPr id="36" name="TextBox 35">
-            <a:extLst>
-              <a:ext uri="{FF2B5EF4-FFF2-40B4-BE49-F238E27FC236}">
-                <a16:creationId xmlns:a16="http://schemas.microsoft.com/office/drawing/2014/main" id="{AF8542DA-2D8F-4C05-A0E0-864B5601A35D}"/>
-              </a:ext>
-            </a:extLst>
-          </p:cNvPr>
-          <p:cNvSpPr txBox="1"/>
-          <p:nvPr/>
-        </p:nvSpPr>
-        <p:spPr>
-          <a:xfrm>
-            <a:off x="5860254" y="2841834"/>
-            <a:ext cx="1547815" cy="338554"/>
-          </a:xfrm>
-          <a:prstGeom prst="rect">
-            <a:avLst/>
-          </a:prstGeom>
-          <a:noFill/>
-        </p:spPr>
-        <p:txBody>
-          <a:bodyPr wrap="square">
-            <a:spAutoFit/>
-          </a:bodyPr>
-          <a:lstStyle/>
-          <a:p>
-            <a:r>
-              <a:rPr lang="en-US" altLang="zh-CN" sz="1600" dirty="0"/>
-              <a:t>IMU sensing</a:t>
             </a:r>
             <a:endParaRPr lang="zh-CN" altLang="en-US" sz="1600" dirty="0"/>
           </a:p>
@@ -46921,6 +47072,13 @@
   <p:clrMapOvr>
     <a:masterClrMapping/>
   </p:clrMapOvr>
+  <p:timing>
+    <p:tnLst>
+      <p:par>
+        <p:cTn id="1" dur="indefinite" restart="never" nodeType="tmRoot"/>
+      </p:par>
+    </p:tnLst>
+  </p:timing>
 </p:sld>
 </file>
 
@@ -46998,12 +47156,186 @@
           </a:p>
         </p:txBody>
       </p:sp>
+      <p:sp>
+        <p:nvSpPr>
+          <p:cNvPr id="35" name="Arrow: Left 34">
+            <a:extLst>
+              <a:ext uri="{FF2B5EF4-FFF2-40B4-BE49-F238E27FC236}">
+                <a16:creationId xmlns:a16="http://schemas.microsoft.com/office/drawing/2014/main" id="{5FA51470-6B85-4A61-9743-C7A1608245E6}"/>
+              </a:ext>
+            </a:extLst>
+          </p:cNvPr>
+          <p:cNvSpPr/>
+          <p:nvPr/>
+        </p:nvSpPr>
+        <p:spPr>
+          <a:xfrm>
+            <a:off x="4877989" y="2792524"/>
+            <a:ext cx="873919" cy="432876"/>
+          </a:xfrm>
+          <a:prstGeom prst="leftArrow">
+            <a:avLst/>
+          </a:prstGeom>
+          <a:solidFill>
+            <a:schemeClr val="bg1">
+              <a:lumMod val="85000"/>
+            </a:schemeClr>
+          </a:solidFill>
+          <a:ln>
+            <a:noFill/>
+          </a:ln>
+        </p:spPr>
+        <p:style>
+          <a:lnRef idx="1">
+            <a:schemeClr val="accent1"/>
+          </a:lnRef>
+          <a:fillRef idx="3">
+            <a:schemeClr val="accent1"/>
+          </a:fillRef>
+          <a:effectRef idx="2">
+            <a:schemeClr val="accent1"/>
+          </a:effectRef>
+          <a:fontRef idx="minor">
+            <a:schemeClr val="lt1"/>
+          </a:fontRef>
+        </p:style>
+        <p:txBody>
+          <a:bodyPr rtlCol="0" anchor="ctr"/>
+          <a:lstStyle/>
+          <a:p>
+            <a:pPr algn="ctr"/>
+            <a:endParaRPr lang="zh-CN" altLang="en-US"/>
+          </a:p>
+        </p:txBody>
+      </p:sp>
+      <p:sp>
+        <p:nvSpPr>
+          <p:cNvPr id="36" name="TextBox 35">
+            <a:extLst>
+              <a:ext uri="{FF2B5EF4-FFF2-40B4-BE49-F238E27FC236}">
+                <a16:creationId xmlns:a16="http://schemas.microsoft.com/office/drawing/2014/main" id="{AF8542DA-2D8F-4C05-A0E0-864B5601A35D}"/>
+              </a:ext>
+            </a:extLst>
+          </p:cNvPr>
+          <p:cNvSpPr txBox="1"/>
+          <p:nvPr/>
+        </p:nvSpPr>
+        <p:spPr>
+          <a:xfrm>
+            <a:off x="5860255" y="2836405"/>
+            <a:ext cx="1547814" cy="338554"/>
+          </a:xfrm>
+          <a:prstGeom prst="rect">
+            <a:avLst/>
+          </a:prstGeom>
+          <a:noFill/>
+        </p:spPr>
+        <p:txBody>
+          <a:bodyPr wrap="square">
+            <a:spAutoFit/>
+          </a:bodyPr>
+          <a:lstStyle/>
+          <a:p>
+            <a:r>
+              <a:rPr lang="en-US" altLang="zh-CN" sz="1600" dirty="0"/>
+              <a:t>IMU sensing</a:t>
+            </a:r>
+            <a:endParaRPr lang="zh-CN" altLang="en-US" sz="1600" dirty="0"/>
+          </a:p>
+        </p:txBody>
+      </p:sp>
+      <p:sp>
+        <p:nvSpPr>
+          <p:cNvPr id="37" name="Arrow: Left 36">
+            <a:extLst>
+              <a:ext uri="{FF2B5EF4-FFF2-40B4-BE49-F238E27FC236}">
+                <a16:creationId xmlns:a16="http://schemas.microsoft.com/office/drawing/2014/main" id="{7D3F6FD2-8411-45B8-9F48-22FFB9FBBCED}"/>
+              </a:ext>
+            </a:extLst>
+          </p:cNvPr>
+          <p:cNvSpPr/>
+          <p:nvPr/>
+        </p:nvSpPr>
+        <p:spPr>
+          <a:xfrm>
+            <a:off x="4877990" y="3985668"/>
+            <a:ext cx="873919" cy="432876"/>
+          </a:xfrm>
+          <a:prstGeom prst="leftArrow">
+            <a:avLst/>
+          </a:prstGeom>
+          <a:solidFill>
+            <a:srgbClr val="C00000"/>
+          </a:solidFill>
+          <a:ln>
+            <a:noFill/>
+          </a:ln>
+        </p:spPr>
+        <p:style>
+          <a:lnRef idx="1">
+            <a:schemeClr val="accent1"/>
+          </a:lnRef>
+          <a:fillRef idx="3">
+            <a:schemeClr val="accent1"/>
+          </a:fillRef>
+          <a:effectRef idx="2">
+            <a:schemeClr val="accent1"/>
+          </a:effectRef>
+          <a:fontRef idx="minor">
+            <a:schemeClr val="lt1"/>
+          </a:fontRef>
+        </p:style>
+        <p:txBody>
+          <a:bodyPr rtlCol="0" anchor="ctr"/>
+          <a:lstStyle/>
+          <a:p>
+            <a:pPr algn="ctr"/>
+            <a:endParaRPr lang="zh-CN" altLang="en-US"/>
+          </a:p>
+        </p:txBody>
+      </p:sp>
+      <p:sp>
+        <p:nvSpPr>
+          <p:cNvPr id="38" name="TextBox 37">
+            <a:extLst>
+              <a:ext uri="{FF2B5EF4-FFF2-40B4-BE49-F238E27FC236}">
+                <a16:creationId xmlns:a16="http://schemas.microsoft.com/office/drawing/2014/main" id="{29EDE4F5-F5FF-4064-B3BB-6298DE91E4E6}"/>
+              </a:ext>
+            </a:extLst>
+          </p:cNvPr>
+          <p:cNvSpPr txBox="1"/>
+          <p:nvPr/>
+        </p:nvSpPr>
+        <p:spPr>
+          <a:xfrm>
+            <a:off x="5860255" y="4022976"/>
+            <a:ext cx="1547814" cy="338554"/>
+          </a:xfrm>
+          <a:prstGeom prst="rect">
+            <a:avLst/>
+          </a:prstGeom>
+          <a:noFill/>
+        </p:spPr>
+        <p:txBody>
+          <a:bodyPr wrap="square">
+            <a:spAutoFit/>
+          </a:bodyPr>
+          <a:lstStyle/>
+          <a:p>
+            <a:r>
+              <a:rPr lang="en-US" altLang="zh-CN" sz="1600" dirty="0"/>
+              <a:t>IMU sensing</a:t>
+            </a:r>
+            <a:endParaRPr lang="zh-CN" altLang="en-US" sz="1600" dirty="0"/>
+          </a:p>
+        </p:txBody>
+      </p:sp>
       <p:cxnSp>
         <p:nvCxnSpPr>
-          <p:cNvPr id="5" name="Straight Connector 4">
+          <p:cNvPr id="4" name="Straight Arrow Connector 3">
             <a:extLst>
               <a:ext uri="{FF2B5EF4-FFF2-40B4-BE49-F238E27FC236}">
-                <a16:creationId xmlns:a16="http://schemas.microsoft.com/office/drawing/2014/main" id="{8AD90B34-C1FB-4F26-B9D4-94703C65F123}"/>
+                <a16:creationId xmlns:a16="http://schemas.microsoft.com/office/drawing/2014/main" id="{6FFE3201-1D96-4368-8B3C-A63B6FAB4870}"/>
               </a:ext>
             </a:extLst>
           </p:cNvPr>
@@ -47014,15 +47346,14 @@
         </p:nvCxnSpPr>
         <p:spPr>
           <a:xfrm>
-            <a:off x="1735931" y="1414463"/>
-            <a:ext cx="0" cy="3220911"/>
-          </a:xfrm>
-          <a:prstGeom prst="line">
-            <a:avLst/>
-          </a:prstGeom>
-          <a:ln w="57150">
-            <a:headEnd type="none" w="med" len="med"/>
-            <a:tailEnd type="triangle" w="med" len="med"/>
+            <a:off x="5414963" y="3326638"/>
+            <a:ext cx="0" cy="617571"/>
+          </a:xfrm>
+          <a:prstGeom prst="straightConnector1">
+            <a:avLst/>
+          </a:prstGeom>
+          <a:ln>
+            <a:tailEnd type="triangle"/>
           </a:ln>
         </p:spPr>
         <p:style>
@@ -47040,1186 +47371,12 @@
           </a:fontRef>
         </p:style>
       </p:cxnSp>
-      <p:sp>
-        <p:nvSpPr>
-          <p:cNvPr id="7" name="Oval 6">
+      <p:cxnSp>
+        <p:nvCxnSpPr>
+          <p:cNvPr id="39" name="Straight Connector 4">
             <a:extLst>
               <a:ext uri="{FF2B5EF4-FFF2-40B4-BE49-F238E27FC236}">
-                <a16:creationId xmlns:a16="http://schemas.microsoft.com/office/drawing/2014/main" id="{3446D5B4-F3E3-4BD3-8D57-850EFD609651}"/>
-              </a:ext>
-            </a:extLst>
-          </p:cNvPr>
-          <p:cNvSpPr/>
-          <p:nvPr/>
-        </p:nvSpPr>
-        <p:spPr>
-          <a:xfrm>
-            <a:off x="1625203" y="1598308"/>
-            <a:ext cx="221456" cy="221456"/>
-          </a:xfrm>
-          <a:prstGeom prst="ellipse">
-            <a:avLst/>
-          </a:prstGeom>
-          <a:solidFill>
-            <a:schemeClr val="tx2">
-              <a:lumMod val="60000"/>
-              <a:lumOff val="40000"/>
-            </a:schemeClr>
-          </a:solidFill>
-          <a:ln>
-            <a:noFill/>
-          </a:ln>
-        </p:spPr>
-        <p:style>
-          <a:lnRef idx="1">
-            <a:schemeClr val="accent1"/>
-          </a:lnRef>
-          <a:fillRef idx="3">
-            <a:schemeClr val="accent1"/>
-          </a:fillRef>
-          <a:effectRef idx="2">
-            <a:schemeClr val="accent1"/>
-          </a:effectRef>
-          <a:fontRef idx="minor">
-            <a:schemeClr val="lt1"/>
-          </a:fontRef>
-        </p:style>
-        <p:txBody>
-          <a:bodyPr rtlCol="0" anchor="ctr"/>
-          <a:lstStyle/>
-          <a:p>
-            <a:pPr algn="ctr"/>
-            <a:endParaRPr lang="zh-CN" altLang="en-US"/>
-          </a:p>
-        </p:txBody>
-      </p:sp>
-      <p:sp>
-        <p:nvSpPr>
-          <p:cNvPr id="11" name="Oval 10">
-            <a:extLst>
-              <a:ext uri="{FF2B5EF4-FFF2-40B4-BE49-F238E27FC236}">
-                <a16:creationId xmlns:a16="http://schemas.microsoft.com/office/drawing/2014/main" id="{4A2013AE-2A02-4CB3-B6BA-0DB97F8A03F0}"/>
-              </a:ext>
-            </a:extLst>
-          </p:cNvPr>
-          <p:cNvSpPr/>
-          <p:nvPr/>
-        </p:nvSpPr>
-        <p:spPr>
-          <a:xfrm>
-            <a:off x="1625203" y="1941856"/>
-            <a:ext cx="221456" cy="221456"/>
-          </a:xfrm>
-          <a:prstGeom prst="ellipse">
-            <a:avLst/>
-          </a:prstGeom>
-          <a:solidFill>
-            <a:schemeClr val="tx2">
-              <a:lumMod val="60000"/>
-              <a:lumOff val="40000"/>
-            </a:schemeClr>
-          </a:solidFill>
-          <a:ln>
-            <a:noFill/>
-          </a:ln>
-        </p:spPr>
-        <p:style>
-          <a:lnRef idx="1">
-            <a:schemeClr val="accent1"/>
-          </a:lnRef>
-          <a:fillRef idx="3">
-            <a:schemeClr val="accent1"/>
-          </a:fillRef>
-          <a:effectRef idx="2">
-            <a:schemeClr val="accent1"/>
-          </a:effectRef>
-          <a:fontRef idx="minor">
-            <a:schemeClr val="lt1"/>
-          </a:fontRef>
-        </p:style>
-        <p:txBody>
-          <a:bodyPr rtlCol="0" anchor="ctr"/>
-          <a:lstStyle/>
-          <a:p>
-            <a:pPr algn="ctr"/>
-            <a:endParaRPr lang="zh-CN" altLang="en-US"/>
-          </a:p>
-        </p:txBody>
-      </p:sp>
-      <p:sp>
-        <p:nvSpPr>
-          <p:cNvPr id="12" name="Oval 11">
-            <a:extLst>
-              <a:ext uri="{FF2B5EF4-FFF2-40B4-BE49-F238E27FC236}">
-                <a16:creationId xmlns:a16="http://schemas.microsoft.com/office/drawing/2014/main" id="{477DD680-3425-4155-BE89-D2512FEEABE5}"/>
-              </a:ext>
-            </a:extLst>
-          </p:cNvPr>
-          <p:cNvSpPr/>
-          <p:nvPr/>
-        </p:nvSpPr>
-        <p:spPr>
-          <a:xfrm>
-            <a:off x="1625203" y="2315981"/>
-            <a:ext cx="221456" cy="221456"/>
-          </a:xfrm>
-          <a:prstGeom prst="ellipse">
-            <a:avLst/>
-          </a:prstGeom>
-          <a:solidFill>
-            <a:schemeClr val="tx2">
-              <a:lumMod val="60000"/>
-              <a:lumOff val="40000"/>
-            </a:schemeClr>
-          </a:solidFill>
-          <a:ln>
-            <a:noFill/>
-          </a:ln>
-        </p:spPr>
-        <p:style>
-          <a:lnRef idx="1">
-            <a:schemeClr val="accent1"/>
-          </a:lnRef>
-          <a:fillRef idx="3">
-            <a:schemeClr val="accent1"/>
-          </a:fillRef>
-          <a:effectRef idx="2">
-            <a:schemeClr val="accent1"/>
-          </a:effectRef>
-          <a:fontRef idx="minor">
-            <a:schemeClr val="lt1"/>
-          </a:fontRef>
-        </p:style>
-        <p:txBody>
-          <a:bodyPr rtlCol="0" anchor="ctr"/>
-          <a:lstStyle/>
-          <a:p>
-            <a:pPr algn="ctr"/>
-            <a:endParaRPr lang="zh-CN" altLang="en-US"/>
-          </a:p>
-        </p:txBody>
-      </p:sp>
-      <p:sp>
-        <p:nvSpPr>
-          <p:cNvPr id="14" name="Oval 13">
-            <a:extLst>
-              <a:ext uri="{FF2B5EF4-FFF2-40B4-BE49-F238E27FC236}">
-                <a16:creationId xmlns:a16="http://schemas.microsoft.com/office/drawing/2014/main" id="{ED77062E-915A-4FFE-9C5F-D9E93AAF0E20}"/>
-              </a:ext>
-            </a:extLst>
-          </p:cNvPr>
-          <p:cNvSpPr/>
-          <p:nvPr/>
-        </p:nvSpPr>
-        <p:spPr>
-          <a:xfrm>
-            <a:off x="1625203" y="2690106"/>
-            <a:ext cx="221456" cy="221456"/>
-          </a:xfrm>
-          <a:prstGeom prst="ellipse">
-            <a:avLst/>
-          </a:prstGeom>
-          <a:solidFill>
-            <a:schemeClr val="tx2">
-              <a:lumMod val="60000"/>
-              <a:lumOff val="40000"/>
-            </a:schemeClr>
-          </a:solidFill>
-          <a:ln>
-            <a:noFill/>
-          </a:ln>
-        </p:spPr>
-        <p:style>
-          <a:lnRef idx="1">
-            <a:schemeClr val="accent1"/>
-          </a:lnRef>
-          <a:fillRef idx="3">
-            <a:schemeClr val="accent1"/>
-          </a:fillRef>
-          <a:effectRef idx="2">
-            <a:schemeClr val="accent1"/>
-          </a:effectRef>
-          <a:fontRef idx="minor">
-            <a:schemeClr val="lt1"/>
-          </a:fontRef>
-        </p:style>
-        <p:txBody>
-          <a:bodyPr rtlCol="0" anchor="ctr"/>
-          <a:lstStyle/>
-          <a:p>
-            <a:pPr algn="ctr"/>
-            <a:endParaRPr lang="zh-CN" altLang="en-US"/>
-          </a:p>
-        </p:txBody>
-      </p:sp>
-      <p:sp>
-        <p:nvSpPr>
-          <p:cNvPr id="15" name="Oval 14">
-            <a:extLst>
-              <a:ext uri="{FF2B5EF4-FFF2-40B4-BE49-F238E27FC236}">
-                <a16:creationId xmlns:a16="http://schemas.microsoft.com/office/drawing/2014/main" id="{8ABAD8CC-DF4A-40C8-9F88-35AF17053828}"/>
-              </a:ext>
-            </a:extLst>
-          </p:cNvPr>
-          <p:cNvSpPr/>
-          <p:nvPr/>
-        </p:nvSpPr>
-        <p:spPr>
-          <a:xfrm>
-            <a:off x="1625203" y="3064231"/>
-            <a:ext cx="221456" cy="221456"/>
-          </a:xfrm>
-          <a:prstGeom prst="ellipse">
-            <a:avLst/>
-          </a:prstGeom>
-          <a:solidFill>
-            <a:schemeClr val="tx2">
-              <a:lumMod val="60000"/>
-              <a:lumOff val="40000"/>
-            </a:schemeClr>
-          </a:solidFill>
-          <a:ln>
-            <a:noFill/>
-          </a:ln>
-        </p:spPr>
-        <p:style>
-          <a:lnRef idx="1">
-            <a:schemeClr val="accent1"/>
-          </a:lnRef>
-          <a:fillRef idx="3">
-            <a:schemeClr val="accent1"/>
-          </a:fillRef>
-          <a:effectRef idx="2">
-            <a:schemeClr val="accent1"/>
-          </a:effectRef>
-          <a:fontRef idx="minor">
-            <a:schemeClr val="lt1"/>
-          </a:fontRef>
-        </p:style>
-        <p:txBody>
-          <a:bodyPr rtlCol="0" anchor="ctr"/>
-          <a:lstStyle/>
-          <a:p>
-            <a:pPr algn="ctr"/>
-            <a:endParaRPr lang="zh-CN" altLang="en-US"/>
-          </a:p>
-        </p:txBody>
-      </p:sp>
-      <p:sp>
-        <p:nvSpPr>
-          <p:cNvPr id="16" name="Oval 15">
-            <a:extLst>
-              <a:ext uri="{FF2B5EF4-FFF2-40B4-BE49-F238E27FC236}">
-                <a16:creationId xmlns:a16="http://schemas.microsoft.com/office/drawing/2014/main" id="{743C11A8-28CA-4B66-BF55-72036E561A09}"/>
-              </a:ext>
-            </a:extLst>
-          </p:cNvPr>
-          <p:cNvSpPr/>
-          <p:nvPr/>
-        </p:nvSpPr>
-        <p:spPr>
-          <a:xfrm>
-            <a:off x="1625203" y="3420176"/>
-            <a:ext cx="221456" cy="221456"/>
-          </a:xfrm>
-          <a:prstGeom prst="ellipse">
-            <a:avLst/>
-          </a:prstGeom>
-          <a:solidFill>
-            <a:schemeClr val="tx2">
-              <a:lumMod val="60000"/>
-              <a:lumOff val="40000"/>
-            </a:schemeClr>
-          </a:solidFill>
-          <a:ln>
-            <a:noFill/>
-          </a:ln>
-        </p:spPr>
-        <p:style>
-          <a:lnRef idx="1">
-            <a:schemeClr val="accent1"/>
-          </a:lnRef>
-          <a:fillRef idx="3">
-            <a:schemeClr val="accent1"/>
-          </a:fillRef>
-          <a:effectRef idx="2">
-            <a:schemeClr val="accent1"/>
-          </a:effectRef>
-          <a:fontRef idx="minor">
-            <a:schemeClr val="lt1"/>
-          </a:fontRef>
-        </p:style>
-        <p:txBody>
-          <a:bodyPr rtlCol="0" anchor="ctr"/>
-          <a:lstStyle/>
-          <a:p>
-            <a:pPr algn="ctr"/>
-            <a:endParaRPr lang="zh-CN" altLang="en-US"/>
-          </a:p>
-        </p:txBody>
-      </p:sp>
-      <p:sp>
-        <p:nvSpPr>
-          <p:cNvPr id="17" name="Oval 16">
-            <a:extLst>
-              <a:ext uri="{FF2B5EF4-FFF2-40B4-BE49-F238E27FC236}">
-                <a16:creationId xmlns:a16="http://schemas.microsoft.com/office/drawing/2014/main" id="{8AAD5B3D-A025-421B-9C4C-EB41D44F37E8}"/>
-              </a:ext>
-            </a:extLst>
-          </p:cNvPr>
-          <p:cNvSpPr/>
-          <p:nvPr/>
-        </p:nvSpPr>
-        <p:spPr>
-          <a:xfrm>
-            <a:off x="1625203" y="3763724"/>
-            <a:ext cx="221456" cy="221456"/>
-          </a:xfrm>
-          <a:prstGeom prst="ellipse">
-            <a:avLst/>
-          </a:prstGeom>
-          <a:solidFill>
-            <a:schemeClr val="tx2">
-              <a:lumMod val="60000"/>
-              <a:lumOff val="40000"/>
-            </a:schemeClr>
-          </a:solidFill>
-          <a:ln>
-            <a:noFill/>
-          </a:ln>
-        </p:spPr>
-        <p:style>
-          <a:lnRef idx="1">
-            <a:schemeClr val="accent1"/>
-          </a:lnRef>
-          <a:fillRef idx="3">
-            <a:schemeClr val="accent1"/>
-          </a:fillRef>
-          <a:effectRef idx="2">
-            <a:schemeClr val="accent1"/>
-          </a:effectRef>
-          <a:fontRef idx="minor">
-            <a:schemeClr val="lt1"/>
-          </a:fontRef>
-        </p:style>
-        <p:txBody>
-          <a:bodyPr rtlCol="0" anchor="ctr"/>
-          <a:lstStyle/>
-          <a:p>
-            <a:pPr algn="ctr"/>
-            <a:endParaRPr lang="zh-CN" altLang="en-US"/>
-          </a:p>
-        </p:txBody>
-      </p:sp>
-      <p:sp>
-        <p:nvSpPr>
-          <p:cNvPr id="18" name="Oval 17">
-            <a:extLst>
-              <a:ext uri="{FF2B5EF4-FFF2-40B4-BE49-F238E27FC236}">
-                <a16:creationId xmlns:a16="http://schemas.microsoft.com/office/drawing/2014/main" id="{1E60ED86-49B4-46DE-BE1E-EAA85615EBD5}"/>
-              </a:ext>
-            </a:extLst>
-          </p:cNvPr>
-          <p:cNvSpPr/>
-          <p:nvPr/>
-        </p:nvSpPr>
-        <p:spPr>
-          <a:xfrm>
-            <a:off x="1625203" y="4095965"/>
-            <a:ext cx="221456" cy="221456"/>
-          </a:xfrm>
-          <a:prstGeom prst="ellipse">
-            <a:avLst/>
-          </a:prstGeom>
-          <a:solidFill>
-            <a:schemeClr val="tx2">
-              <a:lumMod val="60000"/>
-              <a:lumOff val="40000"/>
-            </a:schemeClr>
-          </a:solidFill>
-          <a:ln>
-            <a:noFill/>
-          </a:ln>
-        </p:spPr>
-        <p:style>
-          <a:lnRef idx="1">
-            <a:schemeClr val="accent1"/>
-          </a:lnRef>
-          <a:fillRef idx="3">
-            <a:schemeClr val="accent1"/>
-          </a:fillRef>
-          <a:effectRef idx="2">
-            <a:schemeClr val="accent1"/>
-          </a:effectRef>
-          <a:fontRef idx="minor">
-            <a:schemeClr val="lt1"/>
-          </a:fontRef>
-        </p:style>
-        <p:txBody>
-          <a:bodyPr rtlCol="0" anchor="ctr"/>
-          <a:lstStyle/>
-          <a:p>
-            <a:pPr algn="ctr"/>
-            <a:endParaRPr lang="zh-CN" altLang="en-US"/>
-          </a:p>
-        </p:txBody>
-      </p:sp>
-      <p:sp>
-        <p:nvSpPr>
-          <p:cNvPr id="19" name="TextBox 18">
-            <a:extLst>
-              <a:ext uri="{FF2B5EF4-FFF2-40B4-BE49-F238E27FC236}">
-                <a16:creationId xmlns:a16="http://schemas.microsoft.com/office/drawing/2014/main" id="{956690BA-2D16-41AD-B142-1F34455FC4DD}"/>
-              </a:ext>
-            </a:extLst>
-          </p:cNvPr>
-          <p:cNvSpPr txBox="1"/>
-          <p:nvPr/>
-        </p:nvSpPr>
-        <p:spPr>
-          <a:xfrm>
-            <a:off x="1981200" y="1531067"/>
-            <a:ext cx="2969419" cy="338554"/>
-          </a:xfrm>
-          <a:prstGeom prst="rect">
-            <a:avLst/>
-          </a:prstGeom>
-          <a:noFill/>
-        </p:spPr>
-        <p:txBody>
-          <a:bodyPr wrap="square">
-            <a:spAutoFit/>
-          </a:bodyPr>
-          <a:lstStyle/>
-          <a:p>
-            <a:r>
-              <a:rPr lang="en-US" altLang="zh-CN" sz="1600" dirty="0"/>
-              <a:t>Neural Language models</a:t>
-            </a:r>
-            <a:endParaRPr lang="zh-CN" altLang="en-US" sz="1600" dirty="0"/>
-          </a:p>
-        </p:txBody>
-      </p:sp>
-      <p:sp>
-        <p:nvSpPr>
-          <p:cNvPr id="20" name="TextBox 19">
-            <a:extLst>
-              <a:ext uri="{FF2B5EF4-FFF2-40B4-BE49-F238E27FC236}">
-                <a16:creationId xmlns:a16="http://schemas.microsoft.com/office/drawing/2014/main" id="{53DF2CEA-2134-442B-B89F-E0F5A443DFBC}"/>
-              </a:ext>
-            </a:extLst>
-          </p:cNvPr>
-          <p:cNvSpPr txBox="1"/>
-          <p:nvPr/>
-        </p:nvSpPr>
-        <p:spPr>
-          <a:xfrm>
-            <a:off x="1981201" y="1869621"/>
-            <a:ext cx="2019300" cy="338554"/>
-          </a:xfrm>
-          <a:prstGeom prst="rect">
-            <a:avLst/>
-          </a:prstGeom>
-          <a:noFill/>
-        </p:spPr>
-        <p:txBody>
-          <a:bodyPr wrap="square">
-            <a:spAutoFit/>
-          </a:bodyPr>
-          <a:lstStyle/>
-          <a:p>
-            <a:r>
-              <a:rPr lang="en-US" altLang="zh-CN" sz="1600" dirty="0"/>
-              <a:t>Multi-task learning</a:t>
-            </a:r>
-            <a:endParaRPr lang="zh-CN" altLang="en-US" sz="1600" dirty="0"/>
-          </a:p>
-        </p:txBody>
-      </p:sp>
-      <p:sp>
-        <p:nvSpPr>
-          <p:cNvPr id="21" name="TextBox 20">
-            <a:extLst>
-              <a:ext uri="{FF2B5EF4-FFF2-40B4-BE49-F238E27FC236}">
-                <a16:creationId xmlns:a16="http://schemas.microsoft.com/office/drawing/2014/main" id="{C3A675F7-0329-4D37-9FE1-325135D1B4F2}"/>
-              </a:ext>
-            </a:extLst>
-          </p:cNvPr>
-          <p:cNvSpPr txBox="1"/>
-          <p:nvPr/>
-        </p:nvSpPr>
-        <p:spPr>
-          <a:xfrm>
-            <a:off x="1981200" y="2257432"/>
-            <a:ext cx="2969419" cy="338554"/>
-          </a:xfrm>
-          <a:prstGeom prst="rect">
-            <a:avLst/>
-          </a:prstGeom>
-          <a:noFill/>
-        </p:spPr>
-        <p:txBody>
-          <a:bodyPr wrap="square">
-            <a:spAutoFit/>
-          </a:bodyPr>
-          <a:lstStyle/>
-          <a:p>
-            <a:r>
-              <a:rPr lang="en-US" altLang="zh-CN" sz="1600" dirty="0"/>
-              <a:t>Word embeddings</a:t>
-            </a:r>
-            <a:endParaRPr lang="zh-CN" altLang="en-US" sz="1600" dirty="0"/>
-          </a:p>
-        </p:txBody>
-      </p:sp>
-      <p:sp>
-        <p:nvSpPr>
-          <p:cNvPr id="22" name="TextBox 21">
-            <a:extLst>
-              <a:ext uri="{FF2B5EF4-FFF2-40B4-BE49-F238E27FC236}">
-                <a16:creationId xmlns:a16="http://schemas.microsoft.com/office/drawing/2014/main" id="{E2B8DC11-1EDF-4780-AF19-AA6A65021A1B}"/>
-              </a:ext>
-            </a:extLst>
-          </p:cNvPr>
-          <p:cNvSpPr txBox="1"/>
-          <p:nvPr/>
-        </p:nvSpPr>
-        <p:spPr>
-          <a:xfrm>
-            <a:off x="1981200" y="2631557"/>
-            <a:ext cx="2969419" cy="338554"/>
-          </a:xfrm>
-          <a:prstGeom prst="rect">
-            <a:avLst/>
-          </a:prstGeom>
-          <a:noFill/>
-        </p:spPr>
-        <p:txBody>
-          <a:bodyPr wrap="square">
-            <a:spAutoFit/>
-          </a:bodyPr>
-          <a:lstStyle/>
-          <a:p>
-            <a:r>
-              <a:rPr lang="en-US" altLang="zh-CN" sz="1600" dirty="0"/>
-              <a:t>Neural networks for NLP</a:t>
-            </a:r>
-            <a:endParaRPr lang="zh-CN" altLang="en-US" sz="1600" dirty="0"/>
-          </a:p>
-        </p:txBody>
-      </p:sp>
-      <p:sp>
-        <p:nvSpPr>
-          <p:cNvPr id="23" name="TextBox 22">
-            <a:extLst>
-              <a:ext uri="{FF2B5EF4-FFF2-40B4-BE49-F238E27FC236}">
-                <a16:creationId xmlns:a16="http://schemas.microsoft.com/office/drawing/2014/main" id="{A281806C-0FAB-4CAB-BDCA-8A8AB5FA13BE}"/>
-              </a:ext>
-            </a:extLst>
-          </p:cNvPr>
-          <p:cNvSpPr txBox="1"/>
-          <p:nvPr/>
-        </p:nvSpPr>
-        <p:spPr>
-          <a:xfrm>
-            <a:off x="1981200" y="2989557"/>
-            <a:ext cx="2969419" cy="338554"/>
-          </a:xfrm>
-          <a:prstGeom prst="rect">
-            <a:avLst/>
-          </a:prstGeom>
-          <a:noFill/>
-        </p:spPr>
-        <p:txBody>
-          <a:bodyPr wrap="square">
-            <a:spAutoFit/>
-          </a:bodyPr>
-          <a:lstStyle/>
-          <a:p>
-            <a:r>
-              <a:rPr lang="en-US" altLang="zh-CN" sz="1600" dirty="0"/>
-              <a:t>Sequence-to-sequence models</a:t>
-            </a:r>
-            <a:endParaRPr lang="zh-CN" altLang="en-US" sz="1600" dirty="0"/>
-          </a:p>
-        </p:txBody>
-      </p:sp>
-      <p:sp>
-        <p:nvSpPr>
-          <p:cNvPr id="24" name="TextBox 23">
-            <a:extLst>
-              <a:ext uri="{FF2B5EF4-FFF2-40B4-BE49-F238E27FC236}">
-                <a16:creationId xmlns:a16="http://schemas.microsoft.com/office/drawing/2014/main" id="{4848F40A-7995-4F5E-A9EC-6C4086CAFA6D}"/>
-              </a:ext>
-            </a:extLst>
-          </p:cNvPr>
-          <p:cNvSpPr txBox="1"/>
-          <p:nvPr/>
-        </p:nvSpPr>
-        <p:spPr>
-          <a:xfrm>
-            <a:off x="1981200" y="3346680"/>
-            <a:ext cx="2969419" cy="338554"/>
-          </a:xfrm>
-          <a:prstGeom prst="rect">
-            <a:avLst/>
-          </a:prstGeom>
-          <a:noFill/>
-        </p:spPr>
-        <p:txBody>
-          <a:bodyPr wrap="square">
-            <a:spAutoFit/>
-          </a:bodyPr>
-          <a:lstStyle/>
-          <a:p>
-            <a:r>
-              <a:rPr lang="en-US" altLang="zh-CN" sz="1600" dirty="0"/>
-              <a:t>Attention</a:t>
-            </a:r>
-            <a:endParaRPr lang="zh-CN" altLang="en-US" sz="1600" dirty="0"/>
-          </a:p>
-        </p:txBody>
-      </p:sp>
-      <p:sp>
-        <p:nvSpPr>
-          <p:cNvPr id="25" name="TextBox 24">
-            <a:extLst>
-              <a:ext uri="{FF2B5EF4-FFF2-40B4-BE49-F238E27FC236}">
-                <a16:creationId xmlns:a16="http://schemas.microsoft.com/office/drawing/2014/main" id="{48F6D9E0-9D9B-42BE-A2C4-E4EA74EBB641}"/>
-              </a:ext>
-            </a:extLst>
-          </p:cNvPr>
-          <p:cNvSpPr txBox="1"/>
-          <p:nvPr/>
-        </p:nvSpPr>
-        <p:spPr>
-          <a:xfrm>
-            <a:off x="1981200" y="3703803"/>
-            <a:ext cx="2969419" cy="338554"/>
-          </a:xfrm>
-          <a:prstGeom prst="rect">
-            <a:avLst/>
-          </a:prstGeom>
-          <a:noFill/>
-        </p:spPr>
-        <p:txBody>
-          <a:bodyPr wrap="square">
-            <a:spAutoFit/>
-          </a:bodyPr>
-          <a:lstStyle/>
-          <a:p>
-            <a:r>
-              <a:rPr lang="en-US" altLang="zh-CN" sz="1600" dirty="0"/>
-              <a:t>Memory-based networks</a:t>
-            </a:r>
-            <a:endParaRPr lang="zh-CN" altLang="en-US" sz="1600" dirty="0"/>
-          </a:p>
-        </p:txBody>
-      </p:sp>
-      <p:sp>
-        <p:nvSpPr>
-          <p:cNvPr id="26" name="TextBox 25">
-            <a:extLst>
-              <a:ext uri="{FF2B5EF4-FFF2-40B4-BE49-F238E27FC236}">
-                <a16:creationId xmlns:a16="http://schemas.microsoft.com/office/drawing/2014/main" id="{8BEBA4A8-23EE-45C9-9C1F-A72064F2E3B7}"/>
-              </a:ext>
-            </a:extLst>
-          </p:cNvPr>
-          <p:cNvSpPr txBox="1"/>
-          <p:nvPr/>
-        </p:nvSpPr>
-        <p:spPr>
-          <a:xfrm>
-            <a:off x="1981200" y="4033396"/>
-            <a:ext cx="2969419" cy="338554"/>
-          </a:xfrm>
-          <a:prstGeom prst="rect">
-            <a:avLst/>
-          </a:prstGeom>
-          <a:noFill/>
-        </p:spPr>
-        <p:txBody>
-          <a:bodyPr wrap="square">
-            <a:spAutoFit/>
-          </a:bodyPr>
-          <a:lstStyle/>
-          <a:p>
-            <a:r>
-              <a:rPr lang="en-US" altLang="zh-CN" sz="1600" dirty="0"/>
-              <a:t>Pretrained language models</a:t>
-            </a:r>
-            <a:endParaRPr lang="zh-CN" altLang="en-US" sz="1600" dirty="0"/>
-          </a:p>
-        </p:txBody>
-      </p:sp>
-      <p:sp>
-        <p:nvSpPr>
-          <p:cNvPr id="27" name="TextBox 26">
-            <a:extLst>
-              <a:ext uri="{FF2B5EF4-FFF2-40B4-BE49-F238E27FC236}">
-                <a16:creationId xmlns:a16="http://schemas.microsoft.com/office/drawing/2014/main" id="{C423B5D6-4ECF-4B26-85D4-7C4EEE130E21}"/>
-              </a:ext>
-            </a:extLst>
-          </p:cNvPr>
-          <p:cNvSpPr txBox="1"/>
-          <p:nvPr/>
-        </p:nvSpPr>
-        <p:spPr>
-          <a:xfrm>
-            <a:off x="801292" y="1539759"/>
-            <a:ext cx="720328" cy="338554"/>
-          </a:xfrm>
-          <a:prstGeom prst="rect">
-            <a:avLst/>
-          </a:prstGeom>
-          <a:noFill/>
-        </p:spPr>
-        <p:txBody>
-          <a:bodyPr wrap="square">
-            <a:spAutoFit/>
-          </a:bodyPr>
-          <a:lstStyle/>
-          <a:p>
-            <a:r>
-              <a:rPr lang="en-US" altLang="zh-CN" sz="1600" dirty="0"/>
-              <a:t>2001</a:t>
-            </a:r>
-            <a:endParaRPr lang="zh-CN" altLang="en-US" sz="1600" dirty="0"/>
-          </a:p>
-        </p:txBody>
-      </p:sp>
-      <p:sp>
-        <p:nvSpPr>
-          <p:cNvPr id="28" name="TextBox 27">
-            <a:extLst>
-              <a:ext uri="{FF2B5EF4-FFF2-40B4-BE49-F238E27FC236}">
-                <a16:creationId xmlns:a16="http://schemas.microsoft.com/office/drawing/2014/main" id="{7058102E-2579-47AF-BCD3-7126CAB49406}"/>
-              </a:ext>
-            </a:extLst>
-          </p:cNvPr>
-          <p:cNvSpPr txBox="1"/>
-          <p:nvPr/>
-        </p:nvSpPr>
-        <p:spPr>
-          <a:xfrm>
-            <a:off x="801292" y="1888261"/>
-            <a:ext cx="720328" cy="338554"/>
-          </a:xfrm>
-          <a:prstGeom prst="rect">
-            <a:avLst/>
-          </a:prstGeom>
-          <a:noFill/>
-        </p:spPr>
-        <p:txBody>
-          <a:bodyPr wrap="square">
-            <a:spAutoFit/>
-          </a:bodyPr>
-          <a:lstStyle/>
-          <a:p>
-            <a:r>
-              <a:rPr lang="en-US" altLang="zh-CN" sz="1600" dirty="0"/>
-              <a:t>2008</a:t>
-            </a:r>
-            <a:endParaRPr lang="zh-CN" altLang="en-US" sz="1600" dirty="0"/>
-          </a:p>
-        </p:txBody>
-      </p:sp>
-      <p:sp>
-        <p:nvSpPr>
-          <p:cNvPr id="29" name="TextBox 28">
-            <a:extLst>
-              <a:ext uri="{FF2B5EF4-FFF2-40B4-BE49-F238E27FC236}">
-                <a16:creationId xmlns:a16="http://schemas.microsoft.com/office/drawing/2014/main" id="{B93164C4-AB7A-4E99-948C-09A091953E82}"/>
-              </a:ext>
-            </a:extLst>
-          </p:cNvPr>
-          <p:cNvSpPr txBox="1"/>
-          <p:nvPr/>
-        </p:nvSpPr>
-        <p:spPr>
-          <a:xfrm>
-            <a:off x="801292" y="2258201"/>
-            <a:ext cx="720328" cy="338554"/>
-          </a:xfrm>
-          <a:prstGeom prst="rect">
-            <a:avLst/>
-          </a:prstGeom>
-          <a:noFill/>
-        </p:spPr>
-        <p:txBody>
-          <a:bodyPr wrap="square">
-            <a:spAutoFit/>
-          </a:bodyPr>
-          <a:lstStyle/>
-          <a:p>
-            <a:r>
-              <a:rPr lang="en-US" altLang="zh-CN" sz="1600" dirty="0"/>
-              <a:t>2013</a:t>
-            </a:r>
-            <a:endParaRPr lang="zh-CN" altLang="en-US" sz="1600" dirty="0"/>
-          </a:p>
-        </p:txBody>
-      </p:sp>
-      <p:sp>
-        <p:nvSpPr>
-          <p:cNvPr id="30" name="TextBox 29">
-            <a:extLst>
-              <a:ext uri="{FF2B5EF4-FFF2-40B4-BE49-F238E27FC236}">
-                <a16:creationId xmlns:a16="http://schemas.microsoft.com/office/drawing/2014/main" id="{64769F02-92DA-4A88-80F9-217D8AE2BDCB}"/>
-              </a:ext>
-            </a:extLst>
-          </p:cNvPr>
-          <p:cNvSpPr txBox="1"/>
-          <p:nvPr/>
-        </p:nvSpPr>
-        <p:spPr>
-          <a:xfrm>
-            <a:off x="801292" y="2628141"/>
-            <a:ext cx="720328" cy="338554"/>
-          </a:xfrm>
-          <a:prstGeom prst="rect">
-            <a:avLst/>
-          </a:prstGeom>
-          <a:noFill/>
-        </p:spPr>
-        <p:txBody>
-          <a:bodyPr wrap="square">
-            <a:spAutoFit/>
-          </a:bodyPr>
-          <a:lstStyle/>
-          <a:p>
-            <a:r>
-              <a:rPr lang="en-US" altLang="zh-CN" sz="1600" dirty="0"/>
-              <a:t>2013</a:t>
-            </a:r>
-            <a:endParaRPr lang="zh-CN" altLang="en-US" sz="1600" dirty="0"/>
-          </a:p>
-        </p:txBody>
-      </p:sp>
-      <p:sp>
-        <p:nvSpPr>
-          <p:cNvPr id="31" name="TextBox 30">
-            <a:extLst>
-              <a:ext uri="{FF2B5EF4-FFF2-40B4-BE49-F238E27FC236}">
-                <a16:creationId xmlns:a16="http://schemas.microsoft.com/office/drawing/2014/main" id="{8C155FDC-D571-4837-9B74-C71C1EC51D4F}"/>
-              </a:ext>
-            </a:extLst>
-          </p:cNvPr>
-          <p:cNvSpPr txBox="1"/>
-          <p:nvPr/>
-        </p:nvSpPr>
-        <p:spPr>
-          <a:xfrm>
-            <a:off x="801292" y="2989557"/>
-            <a:ext cx="720328" cy="338554"/>
-          </a:xfrm>
-          <a:prstGeom prst="rect">
-            <a:avLst/>
-          </a:prstGeom>
-          <a:noFill/>
-        </p:spPr>
-        <p:txBody>
-          <a:bodyPr wrap="square">
-            <a:spAutoFit/>
-          </a:bodyPr>
-          <a:lstStyle/>
-          <a:p>
-            <a:r>
-              <a:rPr lang="en-US" altLang="zh-CN" sz="1600" dirty="0"/>
-              <a:t>2014</a:t>
-            </a:r>
-            <a:endParaRPr lang="zh-CN" altLang="en-US" sz="1600" dirty="0"/>
-          </a:p>
-        </p:txBody>
-      </p:sp>
-      <p:sp>
-        <p:nvSpPr>
-          <p:cNvPr id="32" name="TextBox 31">
-            <a:extLst>
-              <a:ext uri="{FF2B5EF4-FFF2-40B4-BE49-F238E27FC236}">
-                <a16:creationId xmlns:a16="http://schemas.microsoft.com/office/drawing/2014/main" id="{4C650DA5-7655-4416-81B7-4715AC491D45}"/>
-              </a:ext>
-            </a:extLst>
-          </p:cNvPr>
-          <p:cNvSpPr txBox="1"/>
-          <p:nvPr/>
-        </p:nvSpPr>
-        <p:spPr>
-          <a:xfrm>
-            <a:off x="801292" y="3365249"/>
-            <a:ext cx="720328" cy="338554"/>
-          </a:xfrm>
-          <a:prstGeom prst="rect">
-            <a:avLst/>
-          </a:prstGeom>
-          <a:noFill/>
-        </p:spPr>
-        <p:txBody>
-          <a:bodyPr wrap="square">
-            <a:spAutoFit/>
-          </a:bodyPr>
-          <a:lstStyle/>
-          <a:p>
-            <a:r>
-              <a:rPr lang="en-US" altLang="zh-CN" sz="1600" dirty="0"/>
-              <a:t>2015</a:t>
-            </a:r>
-            <a:endParaRPr lang="zh-CN" altLang="en-US" sz="1600" dirty="0"/>
-          </a:p>
-        </p:txBody>
-      </p:sp>
-      <p:sp>
-        <p:nvSpPr>
-          <p:cNvPr id="33" name="TextBox 32">
-            <a:extLst>
-              <a:ext uri="{FF2B5EF4-FFF2-40B4-BE49-F238E27FC236}">
-                <a16:creationId xmlns:a16="http://schemas.microsoft.com/office/drawing/2014/main" id="{A216150C-2A43-4CCA-8244-D1FEBFEE5D10}"/>
-              </a:ext>
-            </a:extLst>
-          </p:cNvPr>
-          <p:cNvSpPr txBox="1"/>
-          <p:nvPr/>
-        </p:nvSpPr>
-        <p:spPr>
-          <a:xfrm>
-            <a:off x="801292" y="3694275"/>
-            <a:ext cx="720328" cy="338554"/>
-          </a:xfrm>
-          <a:prstGeom prst="rect">
-            <a:avLst/>
-          </a:prstGeom>
-          <a:noFill/>
-        </p:spPr>
-        <p:txBody>
-          <a:bodyPr wrap="square">
-            <a:spAutoFit/>
-          </a:bodyPr>
-          <a:lstStyle/>
-          <a:p>
-            <a:r>
-              <a:rPr lang="en-US" altLang="zh-CN" sz="1600" dirty="0"/>
-              <a:t>2015</a:t>
-            </a:r>
-            <a:endParaRPr lang="zh-CN" altLang="en-US" sz="1600" dirty="0"/>
-          </a:p>
-        </p:txBody>
-      </p:sp>
-      <p:sp>
-        <p:nvSpPr>
-          <p:cNvPr id="34" name="TextBox 33">
-            <a:extLst>
-              <a:ext uri="{FF2B5EF4-FFF2-40B4-BE49-F238E27FC236}">
-                <a16:creationId xmlns:a16="http://schemas.microsoft.com/office/drawing/2014/main" id="{9474C32C-D486-497C-A082-7318FB9B0D06}"/>
-              </a:ext>
-            </a:extLst>
-          </p:cNvPr>
-          <p:cNvSpPr txBox="1"/>
-          <p:nvPr/>
-        </p:nvSpPr>
-        <p:spPr>
-          <a:xfrm>
-            <a:off x="801292" y="4032829"/>
-            <a:ext cx="720328" cy="338554"/>
-          </a:xfrm>
-          <a:prstGeom prst="rect">
-            <a:avLst/>
-          </a:prstGeom>
-          <a:noFill/>
-        </p:spPr>
-        <p:txBody>
-          <a:bodyPr wrap="square">
-            <a:spAutoFit/>
-          </a:bodyPr>
-          <a:lstStyle/>
-          <a:p>
-            <a:r>
-              <a:rPr lang="en-US" altLang="zh-CN" sz="1600" dirty="0"/>
-              <a:t>2018</a:t>
-            </a:r>
-            <a:endParaRPr lang="zh-CN" altLang="en-US" sz="1600" dirty="0"/>
-          </a:p>
-        </p:txBody>
-      </p:sp>
-      <p:sp>
-        <p:nvSpPr>
-          <p:cNvPr id="35" name="Arrow: Left 34">
-            <a:extLst>
-              <a:ext uri="{FF2B5EF4-FFF2-40B4-BE49-F238E27FC236}">
-                <a16:creationId xmlns:a16="http://schemas.microsoft.com/office/drawing/2014/main" id="{5FA51470-6B85-4A61-9743-C7A1608245E6}"/>
-              </a:ext>
-            </a:extLst>
-          </p:cNvPr>
-          <p:cNvSpPr/>
-          <p:nvPr/>
-        </p:nvSpPr>
-        <p:spPr>
-          <a:xfrm>
-            <a:off x="4877989" y="2792524"/>
-            <a:ext cx="873919" cy="432876"/>
-          </a:xfrm>
-          <a:prstGeom prst="leftArrow">
-            <a:avLst/>
-          </a:prstGeom>
-          <a:solidFill>
-            <a:schemeClr val="bg1">
-              <a:lumMod val="85000"/>
-            </a:schemeClr>
-          </a:solidFill>
-          <a:ln>
-            <a:noFill/>
-          </a:ln>
-        </p:spPr>
-        <p:style>
-          <a:lnRef idx="1">
-            <a:schemeClr val="accent1"/>
-          </a:lnRef>
-          <a:fillRef idx="3">
-            <a:schemeClr val="accent1"/>
-          </a:fillRef>
-          <a:effectRef idx="2">
-            <a:schemeClr val="accent1"/>
-          </a:effectRef>
-          <a:fontRef idx="minor">
-            <a:schemeClr val="lt1"/>
-          </a:fontRef>
-        </p:style>
-        <p:txBody>
-          <a:bodyPr rtlCol="0" anchor="ctr"/>
-          <a:lstStyle/>
-          <a:p>
-            <a:pPr algn="ctr"/>
-            <a:endParaRPr lang="zh-CN" altLang="en-US"/>
-          </a:p>
-        </p:txBody>
-      </p:sp>
-      <p:sp>
-        <p:nvSpPr>
-          <p:cNvPr id="36" name="TextBox 35">
-            <a:extLst>
-              <a:ext uri="{FF2B5EF4-FFF2-40B4-BE49-F238E27FC236}">
-                <a16:creationId xmlns:a16="http://schemas.microsoft.com/office/drawing/2014/main" id="{AF8542DA-2D8F-4C05-A0E0-864B5601A35D}"/>
-              </a:ext>
-            </a:extLst>
-          </p:cNvPr>
-          <p:cNvSpPr txBox="1"/>
-          <p:nvPr/>
-        </p:nvSpPr>
-        <p:spPr>
-          <a:xfrm>
-            <a:off x="5860255" y="2836405"/>
-            <a:ext cx="1547814" cy="338554"/>
-          </a:xfrm>
-          <a:prstGeom prst="rect">
-            <a:avLst/>
-          </a:prstGeom>
-          <a:noFill/>
-        </p:spPr>
-        <p:txBody>
-          <a:bodyPr wrap="square">
-            <a:spAutoFit/>
-          </a:bodyPr>
-          <a:lstStyle/>
-          <a:p>
-            <a:r>
-              <a:rPr lang="en-US" altLang="zh-CN" sz="1600" dirty="0"/>
-              <a:t>IMU sensing</a:t>
-            </a:r>
-            <a:endParaRPr lang="zh-CN" altLang="en-US" sz="1600" dirty="0"/>
-          </a:p>
-        </p:txBody>
-      </p:sp>
-      <p:sp>
-        <p:nvSpPr>
-          <p:cNvPr id="37" name="Arrow: Left 36">
-            <a:extLst>
-              <a:ext uri="{FF2B5EF4-FFF2-40B4-BE49-F238E27FC236}">
-                <a16:creationId xmlns:a16="http://schemas.microsoft.com/office/drawing/2014/main" id="{7D3F6FD2-8411-45B8-9F48-22FFB9FBBCED}"/>
-              </a:ext>
-            </a:extLst>
-          </p:cNvPr>
-          <p:cNvSpPr/>
-          <p:nvPr/>
-        </p:nvSpPr>
-        <p:spPr>
-          <a:xfrm>
-            <a:off x="4877990" y="3985668"/>
-            <a:ext cx="873919" cy="432876"/>
-          </a:xfrm>
-          <a:prstGeom prst="leftArrow">
-            <a:avLst/>
-          </a:prstGeom>
-          <a:solidFill>
-            <a:srgbClr val="C00000"/>
-          </a:solidFill>
-          <a:ln>
-            <a:noFill/>
-          </a:ln>
-        </p:spPr>
-        <p:style>
-          <a:lnRef idx="1">
-            <a:schemeClr val="accent1"/>
-          </a:lnRef>
-          <a:fillRef idx="3">
-            <a:schemeClr val="accent1"/>
-          </a:fillRef>
-          <a:effectRef idx="2">
-            <a:schemeClr val="accent1"/>
-          </a:effectRef>
-          <a:fontRef idx="minor">
-            <a:schemeClr val="lt1"/>
-          </a:fontRef>
-        </p:style>
-        <p:txBody>
-          <a:bodyPr rtlCol="0" anchor="ctr"/>
-          <a:lstStyle/>
-          <a:p>
-            <a:pPr algn="ctr"/>
-            <a:endParaRPr lang="zh-CN" altLang="en-US"/>
-          </a:p>
-        </p:txBody>
-      </p:sp>
-      <p:sp>
-        <p:nvSpPr>
-          <p:cNvPr id="38" name="TextBox 37">
-            <a:extLst>
-              <a:ext uri="{FF2B5EF4-FFF2-40B4-BE49-F238E27FC236}">
-                <a16:creationId xmlns:a16="http://schemas.microsoft.com/office/drawing/2014/main" id="{29EDE4F5-F5FF-4064-B3BB-6298DE91E4E6}"/>
-              </a:ext>
-            </a:extLst>
-          </p:cNvPr>
-          <p:cNvSpPr txBox="1"/>
-          <p:nvPr/>
-        </p:nvSpPr>
-        <p:spPr>
-          <a:xfrm>
-            <a:off x="5860255" y="4022976"/>
-            <a:ext cx="1547814" cy="338554"/>
-          </a:xfrm>
-          <a:prstGeom prst="rect">
-            <a:avLst/>
-          </a:prstGeom>
-          <a:noFill/>
-        </p:spPr>
-        <p:txBody>
-          <a:bodyPr wrap="square">
-            <a:spAutoFit/>
-          </a:bodyPr>
-          <a:lstStyle/>
-          <a:p>
-            <a:r>
-              <a:rPr lang="en-US" altLang="zh-CN" sz="1600" dirty="0"/>
-              <a:t>IMU sensing</a:t>
-            </a:r>
-            <a:endParaRPr lang="zh-CN" altLang="en-US" sz="1600" dirty="0"/>
-          </a:p>
-        </p:txBody>
-      </p:sp>
-      <p:cxnSp>
-        <p:nvCxnSpPr>
-          <p:cNvPr id="4" name="Straight Arrow Connector 3">
-            <a:extLst>
-              <a:ext uri="{FF2B5EF4-FFF2-40B4-BE49-F238E27FC236}">
-                <a16:creationId xmlns:a16="http://schemas.microsoft.com/office/drawing/2014/main" id="{6FFE3201-1D96-4368-8B3C-A63B6FAB4870}"/>
+                <a16:creationId xmlns:a16="http://schemas.microsoft.com/office/drawing/2014/main" id="{8AD90B34-C1FB-4F26-B9D4-94703C65F123}"/>
               </a:ext>
             </a:extLst>
           </p:cNvPr>
@@ -48230,14 +47387,15 @@
         </p:nvCxnSpPr>
         <p:spPr>
           <a:xfrm>
-            <a:off x="5414963" y="3326638"/>
-            <a:ext cx="0" cy="617571"/>
-          </a:xfrm>
-          <a:prstGeom prst="straightConnector1">
-            <a:avLst/>
-          </a:prstGeom>
-          <a:ln>
-            <a:tailEnd type="triangle"/>
+            <a:off x="1735931" y="1414463"/>
+            <a:ext cx="0" cy="3220911"/>
+          </a:xfrm>
+          <a:prstGeom prst="line">
+            <a:avLst/>
+          </a:prstGeom>
+          <a:ln w="57150">
+            <a:headEnd type="none" w="med" len="med"/>
+            <a:tailEnd type="triangle" w="med" len="med"/>
           </a:ln>
         </p:spPr>
         <p:style>
@@ -48255,6 +47413,1013 @@
           </a:fontRef>
         </p:style>
       </p:cxnSp>
+      <p:sp>
+        <p:nvSpPr>
+          <p:cNvPr id="40" name="Oval 6">
+            <a:extLst>
+              <a:ext uri="{FF2B5EF4-FFF2-40B4-BE49-F238E27FC236}">
+                <a16:creationId xmlns:a16="http://schemas.microsoft.com/office/drawing/2014/main" id="{3446D5B4-F3E3-4BD3-8D57-850EFD609651}"/>
+              </a:ext>
+            </a:extLst>
+          </p:cNvPr>
+          <p:cNvSpPr/>
+          <p:nvPr/>
+        </p:nvSpPr>
+        <p:spPr>
+          <a:xfrm>
+            <a:off x="1625203" y="1598308"/>
+            <a:ext cx="221456" cy="221456"/>
+          </a:xfrm>
+          <a:prstGeom prst="ellipse">
+            <a:avLst/>
+          </a:prstGeom>
+          <a:solidFill>
+            <a:schemeClr val="tx2">
+              <a:lumMod val="60000"/>
+              <a:lumOff val="40000"/>
+            </a:schemeClr>
+          </a:solidFill>
+          <a:ln>
+            <a:noFill/>
+          </a:ln>
+        </p:spPr>
+        <p:style>
+          <a:lnRef idx="1">
+            <a:schemeClr val="accent1"/>
+          </a:lnRef>
+          <a:fillRef idx="3">
+            <a:schemeClr val="accent1"/>
+          </a:fillRef>
+          <a:effectRef idx="2">
+            <a:schemeClr val="accent1"/>
+          </a:effectRef>
+          <a:fontRef idx="minor">
+            <a:schemeClr val="lt1"/>
+          </a:fontRef>
+        </p:style>
+        <p:txBody>
+          <a:bodyPr rtlCol="0" anchor="ctr"/>
+          <a:lstStyle/>
+          <a:p>
+            <a:pPr algn="ctr"/>
+            <a:endParaRPr lang="zh-CN" altLang="en-US"/>
+          </a:p>
+        </p:txBody>
+      </p:sp>
+      <p:sp>
+        <p:nvSpPr>
+          <p:cNvPr id="41" name="Oval 10">
+            <a:extLst>
+              <a:ext uri="{FF2B5EF4-FFF2-40B4-BE49-F238E27FC236}">
+                <a16:creationId xmlns:a16="http://schemas.microsoft.com/office/drawing/2014/main" id="{4A2013AE-2A02-4CB3-B6BA-0DB97F8A03F0}"/>
+              </a:ext>
+            </a:extLst>
+          </p:cNvPr>
+          <p:cNvSpPr/>
+          <p:nvPr/>
+        </p:nvSpPr>
+        <p:spPr>
+          <a:xfrm>
+            <a:off x="1625203" y="1941856"/>
+            <a:ext cx="221456" cy="221456"/>
+          </a:xfrm>
+          <a:prstGeom prst="ellipse">
+            <a:avLst/>
+          </a:prstGeom>
+          <a:solidFill>
+            <a:schemeClr val="tx2">
+              <a:lumMod val="60000"/>
+              <a:lumOff val="40000"/>
+            </a:schemeClr>
+          </a:solidFill>
+          <a:ln>
+            <a:noFill/>
+          </a:ln>
+        </p:spPr>
+        <p:style>
+          <a:lnRef idx="1">
+            <a:schemeClr val="accent1"/>
+          </a:lnRef>
+          <a:fillRef idx="3">
+            <a:schemeClr val="accent1"/>
+          </a:fillRef>
+          <a:effectRef idx="2">
+            <a:schemeClr val="accent1"/>
+          </a:effectRef>
+          <a:fontRef idx="minor">
+            <a:schemeClr val="lt1"/>
+          </a:fontRef>
+        </p:style>
+        <p:txBody>
+          <a:bodyPr rtlCol="0" anchor="ctr"/>
+          <a:lstStyle/>
+          <a:p>
+            <a:pPr algn="ctr"/>
+            <a:endParaRPr lang="zh-CN" altLang="en-US"/>
+          </a:p>
+        </p:txBody>
+      </p:sp>
+      <p:sp>
+        <p:nvSpPr>
+          <p:cNvPr id="42" name="Oval 11">
+            <a:extLst>
+              <a:ext uri="{FF2B5EF4-FFF2-40B4-BE49-F238E27FC236}">
+                <a16:creationId xmlns:a16="http://schemas.microsoft.com/office/drawing/2014/main" id="{477DD680-3425-4155-BE89-D2512FEEABE5}"/>
+              </a:ext>
+            </a:extLst>
+          </p:cNvPr>
+          <p:cNvSpPr/>
+          <p:nvPr/>
+        </p:nvSpPr>
+        <p:spPr>
+          <a:xfrm>
+            <a:off x="1625203" y="2315981"/>
+            <a:ext cx="221456" cy="221456"/>
+          </a:xfrm>
+          <a:prstGeom prst="ellipse">
+            <a:avLst/>
+          </a:prstGeom>
+          <a:solidFill>
+            <a:schemeClr val="tx2">
+              <a:lumMod val="60000"/>
+              <a:lumOff val="40000"/>
+            </a:schemeClr>
+          </a:solidFill>
+          <a:ln>
+            <a:noFill/>
+          </a:ln>
+        </p:spPr>
+        <p:style>
+          <a:lnRef idx="1">
+            <a:schemeClr val="accent1"/>
+          </a:lnRef>
+          <a:fillRef idx="3">
+            <a:schemeClr val="accent1"/>
+          </a:fillRef>
+          <a:effectRef idx="2">
+            <a:schemeClr val="accent1"/>
+          </a:effectRef>
+          <a:fontRef idx="minor">
+            <a:schemeClr val="lt1"/>
+          </a:fontRef>
+        </p:style>
+        <p:txBody>
+          <a:bodyPr rtlCol="0" anchor="ctr"/>
+          <a:lstStyle/>
+          <a:p>
+            <a:pPr algn="ctr"/>
+            <a:endParaRPr lang="zh-CN" altLang="en-US"/>
+          </a:p>
+        </p:txBody>
+      </p:sp>
+      <p:sp>
+        <p:nvSpPr>
+          <p:cNvPr id="43" name="Oval 13">
+            <a:extLst>
+              <a:ext uri="{FF2B5EF4-FFF2-40B4-BE49-F238E27FC236}">
+                <a16:creationId xmlns:a16="http://schemas.microsoft.com/office/drawing/2014/main" id="{ED77062E-915A-4FFE-9C5F-D9E93AAF0E20}"/>
+              </a:ext>
+            </a:extLst>
+          </p:cNvPr>
+          <p:cNvSpPr/>
+          <p:nvPr/>
+        </p:nvSpPr>
+        <p:spPr>
+          <a:xfrm>
+            <a:off x="1625203" y="2690106"/>
+            <a:ext cx="221456" cy="221456"/>
+          </a:xfrm>
+          <a:prstGeom prst="ellipse">
+            <a:avLst/>
+          </a:prstGeom>
+          <a:solidFill>
+            <a:schemeClr val="tx2">
+              <a:lumMod val="60000"/>
+              <a:lumOff val="40000"/>
+            </a:schemeClr>
+          </a:solidFill>
+          <a:ln>
+            <a:noFill/>
+          </a:ln>
+        </p:spPr>
+        <p:style>
+          <a:lnRef idx="1">
+            <a:schemeClr val="accent1"/>
+          </a:lnRef>
+          <a:fillRef idx="3">
+            <a:schemeClr val="accent1"/>
+          </a:fillRef>
+          <a:effectRef idx="2">
+            <a:schemeClr val="accent1"/>
+          </a:effectRef>
+          <a:fontRef idx="minor">
+            <a:schemeClr val="lt1"/>
+          </a:fontRef>
+        </p:style>
+        <p:txBody>
+          <a:bodyPr rtlCol="0" anchor="ctr"/>
+          <a:lstStyle/>
+          <a:p>
+            <a:pPr algn="ctr"/>
+            <a:endParaRPr lang="zh-CN" altLang="en-US"/>
+          </a:p>
+        </p:txBody>
+      </p:sp>
+      <p:sp>
+        <p:nvSpPr>
+          <p:cNvPr id="44" name="Oval 14">
+            <a:extLst>
+              <a:ext uri="{FF2B5EF4-FFF2-40B4-BE49-F238E27FC236}">
+                <a16:creationId xmlns:a16="http://schemas.microsoft.com/office/drawing/2014/main" id="{8ABAD8CC-DF4A-40C8-9F88-35AF17053828}"/>
+              </a:ext>
+            </a:extLst>
+          </p:cNvPr>
+          <p:cNvSpPr/>
+          <p:nvPr/>
+        </p:nvSpPr>
+        <p:spPr>
+          <a:xfrm>
+            <a:off x="1625203" y="3064231"/>
+            <a:ext cx="221456" cy="221456"/>
+          </a:xfrm>
+          <a:prstGeom prst="ellipse">
+            <a:avLst/>
+          </a:prstGeom>
+          <a:solidFill>
+            <a:schemeClr val="tx2">
+              <a:lumMod val="60000"/>
+              <a:lumOff val="40000"/>
+            </a:schemeClr>
+          </a:solidFill>
+          <a:ln>
+            <a:noFill/>
+          </a:ln>
+        </p:spPr>
+        <p:style>
+          <a:lnRef idx="1">
+            <a:schemeClr val="accent1"/>
+          </a:lnRef>
+          <a:fillRef idx="3">
+            <a:schemeClr val="accent1"/>
+          </a:fillRef>
+          <a:effectRef idx="2">
+            <a:schemeClr val="accent1"/>
+          </a:effectRef>
+          <a:fontRef idx="minor">
+            <a:schemeClr val="lt1"/>
+          </a:fontRef>
+        </p:style>
+        <p:txBody>
+          <a:bodyPr rtlCol="0" anchor="ctr"/>
+          <a:lstStyle/>
+          <a:p>
+            <a:pPr algn="ctr"/>
+            <a:endParaRPr lang="zh-CN" altLang="en-US"/>
+          </a:p>
+        </p:txBody>
+      </p:sp>
+      <p:sp>
+        <p:nvSpPr>
+          <p:cNvPr id="45" name="Oval 15">
+            <a:extLst>
+              <a:ext uri="{FF2B5EF4-FFF2-40B4-BE49-F238E27FC236}">
+                <a16:creationId xmlns:a16="http://schemas.microsoft.com/office/drawing/2014/main" id="{743C11A8-28CA-4B66-BF55-72036E561A09}"/>
+              </a:ext>
+            </a:extLst>
+          </p:cNvPr>
+          <p:cNvSpPr/>
+          <p:nvPr/>
+        </p:nvSpPr>
+        <p:spPr>
+          <a:xfrm>
+            <a:off x="1625203" y="3420176"/>
+            <a:ext cx="221456" cy="221456"/>
+          </a:xfrm>
+          <a:prstGeom prst="ellipse">
+            <a:avLst/>
+          </a:prstGeom>
+          <a:solidFill>
+            <a:schemeClr val="tx2">
+              <a:lumMod val="60000"/>
+              <a:lumOff val="40000"/>
+            </a:schemeClr>
+          </a:solidFill>
+          <a:ln>
+            <a:noFill/>
+          </a:ln>
+        </p:spPr>
+        <p:style>
+          <a:lnRef idx="1">
+            <a:schemeClr val="accent1"/>
+          </a:lnRef>
+          <a:fillRef idx="3">
+            <a:schemeClr val="accent1"/>
+          </a:fillRef>
+          <a:effectRef idx="2">
+            <a:schemeClr val="accent1"/>
+          </a:effectRef>
+          <a:fontRef idx="minor">
+            <a:schemeClr val="lt1"/>
+          </a:fontRef>
+        </p:style>
+        <p:txBody>
+          <a:bodyPr rtlCol="0" anchor="ctr"/>
+          <a:lstStyle/>
+          <a:p>
+            <a:pPr algn="ctr"/>
+            <a:endParaRPr lang="zh-CN" altLang="en-US"/>
+          </a:p>
+        </p:txBody>
+      </p:sp>
+      <p:sp>
+        <p:nvSpPr>
+          <p:cNvPr id="46" name="Oval 16">
+            <a:extLst>
+              <a:ext uri="{FF2B5EF4-FFF2-40B4-BE49-F238E27FC236}">
+                <a16:creationId xmlns:a16="http://schemas.microsoft.com/office/drawing/2014/main" id="{8AAD5B3D-A025-421B-9C4C-EB41D44F37E8}"/>
+              </a:ext>
+            </a:extLst>
+          </p:cNvPr>
+          <p:cNvSpPr/>
+          <p:nvPr/>
+        </p:nvSpPr>
+        <p:spPr>
+          <a:xfrm>
+            <a:off x="1625203" y="3763724"/>
+            <a:ext cx="221456" cy="221456"/>
+          </a:xfrm>
+          <a:prstGeom prst="ellipse">
+            <a:avLst/>
+          </a:prstGeom>
+          <a:solidFill>
+            <a:schemeClr val="tx2">
+              <a:lumMod val="60000"/>
+              <a:lumOff val="40000"/>
+            </a:schemeClr>
+          </a:solidFill>
+          <a:ln>
+            <a:noFill/>
+          </a:ln>
+        </p:spPr>
+        <p:style>
+          <a:lnRef idx="1">
+            <a:schemeClr val="accent1"/>
+          </a:lnRef>
+          <a:fillRef idx="3">
+            <a:schemeClr val="accent1"/>
+          </a:fillRef>
+          <a:effectRef idx="2">
+            <a:schemeClr val="accent1"/>
+          </a:effectRef>
+          <a:fontRef idx="minor">
+            <a:schemeClr val="lt1"/>
+          </a:fontRef>
+        </p:style>
+        <p:txBody>
+          <a:bodyPr rtlCol="0" anchor="ctr"/>
+          <a:lstStyle/>
+          <a:p>
+            <a:pPr algn="ctr"/>
+            <a:endParaRPr lang="zh-CN" altLang="en-US"/>
+          </a:p>
+        </p:txBody>
+      </p:sp>
+      <p:sp>
+        <p:nvSpPr>
+          <p:cNvPr id="47" name="Oval 17">
+            <a:extLst>
+              <a:ext uri="{FF2B5EF4-FFF2-40B4-BE49-F238E27FC236}">
+                <a16:creationId xmlns:a16="http://schemas.microsoft.com/office/drawing/2014/main" id="{1E60ED86-49B4-46DE-BE1E-EAA85615EBD5}"/>
+              </a:ext>
+            </a:extLst>
+          </p:cNvPr>
+          <p:cNvSpPr/>
+          <p:nvPr/>
+        </p:nvSpPr>
+        <p:spPr>
+          <a:xfrm>
+            <a:off x="1625203" y="4095965"/>
+            <a:ext cx="221456" cy="221456"/>
+          </a:xfrm>
+          <a:prstGeom prst="ellipse">
+            <a:avLst/>
+          </a:prstGeom>
+          <a:solidFill>
+            <a:schemeClr val="tx2">
+              <a:lumMod val="60000"/>
+              <a:lumOff val="40000"/>
+            </a:schemeClr>
+          </a:solidFill>
+          <a:ln>
+            <a:noFill/>
+          </a:ln>
+        </p:spPr>
+        <p:style>
+          <a:lnRef idx="1">
+            <a:schemeClr val="accent1"/>
+          </a:lnRef>
+          <a:fillRef idx="3">
+            <a:schemeClr val="accent1"/>
+          </a:fillRef>
+          <a:effectRef idx="2">
+            <a:schemeClr val="accent1"/>
+          </a:effectRef>
+          <a:fontRef idx="minor">
+            <a:schemeClr val="lt1"/>
+          </a:fontRef>
+        </p:style>
+        <p:txBody>
+          <a:bodyPr rtlCol="0" anchor="ctr"/>
+          <a:lstStyle/>
+          <a:p>
+            <a:pPr algn="ctr"/>
+            <a:endParaRPr lang="zh-CN" altLang="en-US"/>
+          </a:p>
+        </p:txBody>
+      </p:sp>
+      <p:sp>
+        <p:nvSpPr>
+          <p:cNvPr id="48" name="TextBox 18">
+            <a:extLst>
+              <a:ext uri="{FF2B5EF4-FFF2-40B4-BE49-F238E27FC236}">
+                <a16:creationId xmlns:a16="http://schemas.microsoft.com/office/drawing/2014/main" id="{956690BA-2D16-41AD-B142-1F34455FC4DD}"/>
+              </a:ext>
+            </a:extLst>
+          </p:cNvPr>
+          <p:cNvSpPr txBox="1"/>
+          <p:nvPr/>
+        </p:nvSpPr>
+        <p:spPr>
+          <a:xfrm>
+            <a:off x="1981200" y="1531067"/>
+            <a:ext cx="2969419" cy="338554"/>
+          </a:xfrm>
+          <a:prstGeom prst="rect">
+            <a:avLst/>
+          </a:prstGeom>
+          <a:noFill/>
+        </p:spPr>
+        <p:txBody>
+          <a:bodyPr wrap="square">
+            <a:spAutoFit/>
+          </a:bodyPr>
+          <a:lstStyle/>
+          <a:p>
+            <a:r>
+              <a:rPr lang="en-US" altLang="zh-CN" sz="1600" dirty="0"/>
+              <a:t>Neural Language models</a:t>
+            </a:r>
+            <a:endParaRPr lang="zh-CN" altLang="en-US" sz="1600" dirty="0"/>
+          </a:p>
+        </p:txBody>
+      </p:sp>
+      <p:sp>
+        <p:nvSpPr>
+          <p:cNvPr id="49" name="TextBox 19">
+            <a:extLst>
+              <a:ext uri="{FF2B5EF4-FFF2-40B4-BE49-F238E27FC236}">
+                <a16:creationId xmlns:a16="http://schemas.microsoft.com/office/drawing/2014/main" id="{53DF2CEA-2134-442B-B89F-E0F5A443DFBC}"/>
+              </a:ext>
+            </a:extLst>
+          </p:cNvPr>
+          <p:cNvSpPr txBox="1"/>
+          <p:nvPr/>
+        </p:nvSpPr>
+        <p:spPr>
+          <a:xfrm>
+            <a:off x="1981201" y="1869621"/>
+            <a:ext cx="2019300" cy="338554"/>
+          </a:xfrm>
+          <a:prstGeom prst="rect">
+            <a:avLst/>
+          </a:prstGeom>
+          <a:noFill/>
+        </p:spPr>
+        <p:txBody>
+          <a:bodyPr wrap="square">
+            <a:spAutoFit/>
+          </a:bodyPr>
+          <a:lstStyle/>
+          <a:p>
+            <a:r>
+              <a:rPr lang="en-US" altLang="zh-CN" sz="1600" dirty="0"/>
+              <a:t>Multi-task learning</a:t>
+            </a:r>
+            <a:endParaRPr lang="zh-CN" altLang="en-US" sz="1600" dirty="0"/>
+          </a:p>
+        </p:txBody>
+      </p:sp>
+      <p:sp>
+        <p:nvSpPr>
+          <p:cNvPr id="50" name="TextBox 20">
+            <a:extLst>
+              <a:ext uri="{FF2B5EF4-FFF2-40B4-BE49-F238E27FC236}">
+                <a16:creationId xmlns:a16="http://schemas.microsoft.com/office/drawing/2014/main" id="{C3A675F7-0329-4D37-9FE1-325135D1B4F2}"/>
+              </a:ext>
+            </a:extLst>
+          </p:cNvPr>
+          <p:cNvSpPr txBox="1"/>
+          <p:nvPr/>
+        </p:nvSpPr>
+        <p:spPr>
+          <a:xfrm>
+            <a:off x="1981200" y="2257432"/>
+            <a:ext cx="2969419" cy="338554"/>
+          </a:xfrm>
+          <a:prstGeom prst="rect">
+            <a:avLst/>
+          </a:prstGeom>
+          <a:noFill/>
+        </p:spPr>
+        <p:txBody>
+          <a:bodyPr wrap="square">
+            <a:spAutoFit/>
+          </a:bodyPr>
+          <a:lstStyle/>
+          <a:p>
+            <a:r>
+              <a:rPr lang="en-US" altLang="zh-CN" sz="1600" dirty="0"/>
+              <a:t>Word embeddings</a:t>
+            </a:r>
+            <a:endParaRPr lang="zh-CN" altLang="en-US" sz="1600" dirty="0"/>
+          </a:p>
+        </p:txBody>
+      </p:sp>
+      <p:sp>
+        <p:nvSpPr>
+          <p:cNvPr id="51" name="TextBox 21">
+            <a:extLst>
+              <a:ext uri="{FF2B5EF4-FFF2-40B4-BE49-F238E27FC236}">
+                <a16:creationId xmlns:a16="http://schemas.microsoft.com/office/drawing/2014/main" id="{E2B8DC11-1EDF-4780-AF19-AA6A65021A1B}"/>
+              </a:ext>
+            </a:extLst>
+          </p:cNvPr>
+          <p:cNvSpPr txBox="1"/>
+          <p:nvPr/>
+        </p:nvSpPr>
+        <p:spPr>
+          <a:xfrm>
+            <a:off x="1981200" y="2631557"/>
+            <a:ext cx="2969419" cy="338554"/>
+          </a:xfrm>
+          <a:prstGeom prst="rect">
+            <a:avLst/>
+          </a:prstGeom>
+          <a:noFill/>
+        </p:spPr>
+        <p:txBody>
+          <a:bodyPr wrap="square">
+            <a:spAutoFit/>
+          </a:bodyPr>
+          <a:lstStyle/>
+          <a:p>
+            <a:r>
+              <a:rPr lang="en-US" altLang="zh-CN" sz="1600" dirty="0"/>
+              <a:t>Neural networks for NLP</a:t>
+            </a:r>
+            <a:endParaRPr lang="zh-CN" altLang="en-US" sz="1600" dirty="0"/>
+          </a:p>
+        </p:txBody>
+      </p:sp>
+      <p:sp>
+        <p:nvSpPr>
+          <p:cNvPr id="52" name="TextBox 22">
+            <a:extLst>
+              <a:ext uri="{FF2B5EF4-FFF2-40B4-BE49-F238E27FC236}">
+                <a16:creationId xmlns:a16="http://schemas.microsoft.com/office/drawing/2014/main" id="{A281806C-0FAB-4CAB-BDCA-8A8AB5FA13BE}"/>
+              </a:ext>
+            </a:extLst>
+          </p:cNvPr>
+          <p:cNvSpPr txBox="1"/>
+          <p:nvPr/>
+        </p:nvSpPr>
+        <p:spPr>
+          <a:xfrm>
+            <a:off x="1981200" y="2989557"/>
+            <a:ext cx="2969419" cy="338554"/>
+          </a:xfrm>
+          <a:prstGeom prst="rect">
+            <a:avLst/>
+          </a:prstGeom>
+          <a:noFill/>
+        </p:spPr>
+        <p:txBody>
+          <a:bodyPr wrap="square">
+            <a:spAutoFit/>
+          </a:bodyPr>
+          <a:lstStyle/>
+          <a:p>
+            <a:r>
+              <a:rPr lang="en-US" altLang="zh-CN" sz="1600" dirty="0"/>
+              <a:t>Sequence-to-sequence models</a:t>
+            </a:r>
+            <a:endParaRPr lang="zh-CN" altLang="en-US" sz="1600" dirty="0"/>
+          </a:p>
+        </p:txBody>
+      </p:sp>
+      <p:sp>
+        <p:nvSpPr>
+          <p:cNvPr id="53" name="TextBox 23">
+            <a:extLst>
+              <a:ext uri="{FF2B5EF4-FFF2-40B4-BE49-F238E27FC236}">
+                <a16:creationId xmlns:a16="http://schemas.microsoft.com/office/drawing/2014/main" id="{4848F40A-7995-4F5E-A9EC-6C4086CAFA6D}"/>
+              </a:ext>
+            </a:extLst>
+          </p:cNvPr>
+          <p:cNvSpPr txBox="1"/>
+          <p:nvPr/>
+        </p:nvSpPr>
+        <p:spPr>
+          <a:xfrm>
+            <a:off x="1981200" y="3346680"/>
+            <a:ext cx="2969419" cy="584775"/>
+          </a:xfrm>
+          <a:prstGeom prst="rect">
+            <a:avLst/>
+          </a:prstGeom>
+          <a:noFill/>
+        </p:spPr>
+        <p:txBody>
+          <a:bodyPr wrap="square">
+            <a:spAutoFit/>
+          </a:bodyPr>
+          <a:lstStyle/>
+          <a:p>
+            <a:r>
+              <a:rPr lang="en-US" altLang="zh-CN" sz="1600" dirty="0" smtClean="0"/>
+              <a:t>Memory-based </a:t>
+            </a:r>
+            <a:r>
+              <a:rPr lang="en-US" altLang="zh-CN" sz="1600" dirty="0"/>
+              <a:t>networks</a:t>
+            </a:r>
+            <a:endParaRPr lang="zh-CN" altLang="en-US" sz="1600" dirty="0"/>
+          </a:p>
+          <a:p>
+            <a:endParaRPr lang="zh-CN" altLang="en-US" sz="1600" dirty="0"/>
+          </a:p>
+        </p:txBody>
+      </p:sp>
+      <p:sp>
+        <p:nvSpPr>
+          <p:cNvPr id="54" name="TextBox 24">
+            <a:extLst>
+              <a:ext uri="{FF2B5EF4-FFF2-40B4-BE49-F238E27FC236}">
+                <a16:creationId xmlns:a16="http://schemas.microsoft.com/office/drawing/2014/main" id="{48F6D9E0-9D9B-42BE-A2C4-E4EA74EBB641}"/>
+              </a:ext>
+            </a:extLst>
+          </p:cNvPr>
+          <p:cNvSpPr txBox="1"/>
+          <p:nvPr/>
+        </p:nvSpPr>
+        <p:spPr>
+          <a:xfrm>
+            <a:off x="1981200" y="3703803"/>
+            <a:ext cx="2969419" cy="338554"/>
+          </a:xfrm>
+          <a:prstGeom prst="rect">
+            <a:avLst/>
+          </a:prstGeom>
+          <a:noFill/>
+        </p:spPr>
+        <p:txBody>
+          <a:bodyPr wrap="square">
+            <a:spAutoFit/>
+          </a:bodyPr>
+          <a:lstStyle/>
+          <a:p>
+            <a:r>
+              <a:rPr lang="en-US" altLang="zh-CN" sz="1600"/>
+              <a:t>Attention</a:t>
+            </a:r>
+            <a:endParaRPr lang="zh-CN" altLang="en-US" sz="1600" dirty="0"/>
+          </a:p>
+        </p:txBody>
+      </p:sp>
+      <p:sp>
+        <p:nvSpPr>
+          <p:cNvPr id="55" name="TextBox 25">
+            <a:extLst>
+              <a:ext uri="{FF2B5EF4-FFF2-40B4-BE49-F238E27FC236}">
+                <a16:creationId xmlns:a16="http://schemas.microsoft.com/office/drawing/2014/main" id="{8BEBA4A8-23EE-45C9-9C1F-A72064F2E3B7}"/>
+              </a:ext>
+            </a:extLst>
+          </p:cNvPr>
+          <p:cNvSpPr txBox="1"/>
+          <p:nvPr/>
+        </p:nvSpPr>
+        <p:spPr>
+          <a:xfrm>
+            <a:off x="1981200" y="4033396"/>
+            <a:ext cx="2969419" cy="338554"/>
+          </a:xfrm>
+          <a:prstGeom prst="rect">
+            <a:avLst/>
+          </a:prstGeom>
+          <a:noFill/>
+        </p:spPr>
+        <p:txBody>
+          <a:bodyPr wrap="square">
+            <a:spAutoFit/>
+          </a:bodyPr>
+          <a:lstStyle/>
+          <a:p>
+            <a:r>
+              <a:rPr lang="en-US" altLang="zh-CN" sz="1600" dirty="0"/>
+              <a:t>Pretrained language models</a:t>
+            </a:r>
+            <a:endParaRPr lang="zh-CN" altLang="en-US" sz="1600" dirty="0"/>
+          </a:p>
+        </p:txBody>
+      </p:sp>
+      <p:sp>
+        <p:nvSpPr>
+          <p:cNvPr id="56" name="TextBox 26">
+            <a:extLst>
+              <a:ext uri="{FF2B5EF4-FFF2-40B4-BE49-F238E27FC236}">
+                <a16:creationId xmlns:a16="http://schemas.microsoft.com/office/drawing/2014/main" id="{C423B5D6-4ECF-4B26-85D4-7C4EEE130E21}"/>
+              </a:ext>
+            </a:extLst>
+          </p:cNvPr>
+          <p:cNvSpPr txBox="1"/>
+          <p:nvPr/>
+        </p:nvSpPr>
+        <p:spPr>
+          <a:xfrm>
+            <a:off x="801292" y="1539759"/>
+            <a:ext cx="720328" cy="338554"/>
+          </a:xfrm>
+          <a:prstGeom prst="rect">
+            <a:avLst/>
+          </a:prstGeom>
+          <a:noFill/>
+        </p:spPr>
+        <p:txBody>
+          <a:bodyPr wrap="square">
+            <a:spAutoFit/>
+          </a:bodyPr>
+          <a:lstStyle/>
+          <a:p>
+            <a:r>
+              <a:rPr lang="en-US" altLang="zh-CN" sz="1600" dirty="0"/>
+              <a:t>2001</a:t>
+            </a:r>
+            <a:endParaRPr lang="zh-CN" altLang="en-US" sz="1600" dirty="0"/>
+          </a:p>
+        </p:txBody>
+      </p:sp>
+      <p:sp>
+        <p:nvSpPr>
+          <p:cNvPr id="57" name="TextBox 27">
+            <a:extLst>
+              <a:ext uri="{FF2B5EF4-FFF2-40B4-BE49-F238E27FC236}">
+                <a16:creationId xmlns:a16="http://schemas.microsoft.com/office/drawing/2014/main" id="{7058102E-2579-47AF-BCD3-7126CAB49406}"/>
+              </a:ext>
+            </a:extLst>
+          </p:cNvPr>
+          <p:cNvSpPr txBox="1"/>
+          <p:nvPr/>
+        </p:nvSpPr>
+        <p:spPr>
+          <a:xfrm>
+            <a:off x="801292" y="1888261"/>
+            <a:ext cx="720328" cy="338554"/>
+          </a:xfrm>
+          <a:prstGeom prst="rect">
+            <a:avLst/>
+          </a:prstGeom>
+          <a:noFill/>
+        </p:spPr>
+        <p:txBody>
+          <a:bodyPr wrap="square">
+            <a:spAutoFit/>
+          </a:bodyPr>
+          <a:lstStyle/>
+          <a:p>
+            <a:r>
+              <a:rPr lang="en-US" altLang="zh-CN" sz="1600" dirty="0"/>
+              <a:t>2008</a:t>
+            </a:r>
+            <a:endParaRPr lang="zh-CN" altLang="en-US" sz="1600" dirty="0"/>
+          </a:p>
+        </p:txBody>
+      </p:sp>
+      <p:sp>
+        <p:nvSpPr>
+          <p:cNvPr id="58" name="TextBox 28">
+            <a:extLst>
+              <a:ext uri="{FF2B5EF4-FFF2-40B4-BE49-F238E27FC236}">
+                <a16:creationId xmlns:a16="http://schemas.microsoft.com/office/drawing/2014/main" id="{B93164C4-AB7A-4E99-948C-09A091953E82}"/>
+              </a:ext>
+            </a:extLst>
+          </p:cNvPr>
+          <p:cNvSpPr txBox="1"/>
+          <p:nvPr/>
+        </p:nvSpPr>
+        <p:spPr>
+          <a:xfrm>
+            <a:off x="801292" y="2258201"/>
+            <a:ext cx="720328" cy="338554"/>
+          </a:xfrm>
+          <a:prstGeom prst="rect">
+            <a:avLst/>
+          </a:prstGeom>
+          <a:noFill/>
+        </p:spPr>
+        <p:txBody>
+          <a:bodyPr wrap="square">
+            <a:spAutoFit/>
+          </a:bodyPr>
+          <a:lstStyle/>
+          <a:p>
+            <a:r>
+              <a:rPr lang="en-US" altLang="zh-CN" sz="1600" dirty="0"/>
+              <a:t>2013</a:t>
+            </a:r>
+            <a:endParaRPr lang="zh-CN" altLang="en-US" sz="1600" dirty="0"/>
+          </a:p>
+        </p:txBody>
+      </p:sp>
+      <p:sp>
+        <p:nvSpPr>
+          <p:cNvPr id="59" name="TextBox 29">
+            <a:extLst>
+              <a:ext uri="{FF2B5EF4-FFF2-40B4-BE49-F238E27FC236}">
+                <a16:creationId xmlns:a16="http://schemas.microsoft.com/office/drawing/2014/main" id="{64769F02-92DA-4A88-80F9-217D8AE2BDCB}"/>
+              </a:ext>
+            </a:extLst>
+          </p:cNvPr>
+          <p:cNvSpPr txBox="1"/>
+          <p:nvPr/>
+        </p:nvSpPr>
+        <p:spPr>
+          <a:xfrm>
+            <a:off x="801292" y="2628141"/>
+            <a:ext cx="720328" cy="338554"/>
+          </a:xfrm>
+          <a:prstGeom prst="rect">
+            <a:avLst/>
+          </a:prstGeom>
+          <a:noFill/>
+        </p:spPr>
+        <p:txBody>
+          <a:bodyPr wrap="square">
+            <a:spAutoFit/>
+          </a:bodyPr>
+          <a:lstStyle/>
+          <a:p>
+            <a:r>
+              <a:rPr lang="en-US" altLang="zh-CN" sz="1600" dirty="0"/>
+              <a:t>2013</a:t>
+            </a:r>
+            <a:endParaRPr lang="zh-CN" altLang="en-US" sz="1600" dirty="0"/>
+          </a:p>
+        </p:txBody>
+      </p:sp>
+      <p:sp>
+        <p:nvSpPr>
+          <p:cNvPr id="60" name="TextBox 30">
+            <a:extLst>
+              <a:ext uri="{FF2B5EF4-FFF2-40B4-BE49-F238E27FC236}">
+                <a16:creationId xmlns:a16="http://schemas.microsoft.com/office/drawing/2014/main" id="{8C155FDC-D571-4837-9B74-C71C1EC51D4F}"/>
+              </a:ext>
+            </a:extLst>
+          </p:cNvPr>
+          <p:cNvSpPr txBox="1"/>
+          <p:nvPr/>
+        </p:nvSpPr>
+        <p:spPr>
+          <a:xfrm>
+            <a:off x="801292" y="2989557"/>
+            <a:ext cx="720328" cy="338554"/>
+          </a:xfrm>
+          <a:prstGeom prst="rect">
+            <a:avLst/>
+          </a:prstGeom>
+          <a:noFill/>
+        </p:spPr>
+        <p:txBody>
+          <a:bodyPr wrap="square">
+            <a:spAutoFit/>
+          </a:bodyPr>
+          <a:lstStyle/>
+          <a:p>
+            <a:r>
+              <a:rPr lang="en-US" altLang="zh-CN" sz="1600" dirty="0"/>
+              <a:t>2014</a:t>
+            </a:r>
+            <a:endParaRPr lang="zh-CN" altLang="en-US" sz="1600" dirty="0"/>
+          </a:p>
+        </p:txBody>
+      </p:sp>
+      <p:sp>
+        <p:nvSpPr>
+          <p:cNvPr id="61" name="TextBox 31">
+            <a:extLst>
+              <a:ext uri="{FF2B5EF4-FFF2-40B4-BE49-F238E27FC236}">
+                <a16:creationId xmlns:a16="http://schemas.microsoft.com/office/drawing/2014/main" id="{4C650DA5-7655-4416-81B7-4715AC491D45}"/>
+              </a:ext>
+            </a:extLst>
+          </p:cNvPr>
+          <p:cNvSpPr txBox="1"/>
+          <p:nvPr/>
+        </p:nvSpPr>
+        <p:spPr>
+          <a:xfrm>
+            <a:off x="801292" y="3365249"/>
+            <a:ext cx="720328" cy="338554"/>
+          </a:xfrm>
+          <a:prstGeom prst="rect">
+            <a:avLst/>
+          </a:prstGeom>
+          <a:noFill/>
+        </p:spPr>
+        <p:txBody>
+          <a:bodyPr wrap="square">
+            <a:spAutoFit/>
+          </a:bodyPr>
+          <a:lstStyle/>
+          <a:p>
+            <a:r>
+              <a:rPr lang="en-US" altLang="zh-CN" sz="1600" dirty="0"/>
+              <a:t>2015</a:t>
+            </a:r>
+            <a:endParaRPr lang="zh-CN" altLang="en-US" sz="1600" dirty="0"/>
+          </a:p>
+        </p:txBody>
+      </p:sp>
+      <p:sp>
+        <p:nvSpPr>
+          <p:cNvPr id="62" name="TextBox 32">
+            <a:extLst>
+              <a:ext uri="{FF2B5EF4-FFF2-40B4-BE49-F238E27FC236}">
+                <a16:creationId xmlns:a16="http://schemas.microsoft.com/office/drawing/2014/main" id="{A216150C-2A43-4CCA-8244-D1FEBFEE5D10}"/>
+              </a:ext>
+            </a:extLst>
+          </p:cNvPr>
+          <p:cNvSpPr txBox="1"/>
+          <p:nvPr/>
+        </p:nvSpPr>
+        <p:spPr>
+          <a:xfrm>
+            <a:off x="801292" y="3694275"/>
+            <a:ext cx="720328" cy="338554"/>
+          </a:xfrm>
+          <a:prstGeom prst="rect">
+            <a:avLst/>
+          </a:prstGeom>
+          <a:noFill/>
+        </p:spPr>
+        <p:txBody>
+          <a:bodyPr wrap="square">
+            <a:spAutoFit/>
+          </a:bodyPr>
+          <a:lstStyle/>
+          <a:p>
+            <a:r>
+              <a:rPr lang="en-US" altLang="zh-CN" sz="1600" dirty="0" smtClean="0"/>
+              <a:t>2017</a:t>
+            </a:r>
+            <a:endParaRPr lang="zh-CN" altLang="en-US" sz="1600" dirty="0"/>
+          </a:p>
+        </p:txBody>
+      </p:sp>
+      <p:sp>
+        <p:nvSpPr>
+          <p:cNvPr id="63" name="TextBox 33">
+            <a:extLst>
+              <a:ext uri="{FF2B5EF4-FFF2-40B4-BE49-F238E27FC236}">
+                <a16:creationId xmlns:a16="http://schemas.microsoft.com/office/drawing/2014/main" id="{9474C32C-D486-497C-A082-7318FB9B0D06}"/>
+              </a:ext>
+            </a:extLst>
+          </p:cNvPr>
+          <p:cNvSpPr txBox="1"/>
+          <p:nvPr/>
+        </p:nvSpPr>
+        <p:spPr>
+          <a:xfrm>
+            <a:off x="801292" y="4032829"/>
+            <a:ext cx="720328" cy="338554"/>
+          </a:xfrm>
+          <a:prstGeom prst="rect">
+            <a:avLst/>
+          </a:prstGeom>
+          <a:noFill/>
+        </p:spPr>
+        <p:txBody>
+          <a:bodyPr wrap="square">
+            <a:spAutoFit/>
+          </a:bodyPr>
+          <a:lstStyle/>
+          <a:p>
+            <a:r>
+              <a:rPr lang="en-US" altLang="zh-CN" sz="1600" dirty="0"/>
+              <a:t>2018</a:t>
+            </a:r>
+            <a:endParaRPr lang="zh-CN" altLang="en-US" sz="1600" dirty="0"/>
+          </a:p>
+        </p:txBody>
+      </p:sp>
     </p:spTree>
     <p:extLst>
       <p:ext uri="{BB962C8B-B14F-4D97-AF65-F5344CB8AC3E}">
@@ -48265,6 +48430,13 @@
   <p:clrMapOvr>
     <a:masterClrMapping/>
   </p:clrMapOvr>
+  <p:timing>
+    <p:tnLst>
+      <p:par>
+        <p:cTn id="1" dur="indefinite" restart="never" nodeType="tmRoot"/>
+      </p:par>
+    </p:tnLst>
+  </p:timing>
 </p:sld>
 </file>
 
@@ -49236,12 +49408,6 @@
 </file>
 
 <file path=customXml/item1.xml><?xml version="1.0" encoding="utf-8"?>
-<p:properties xmlns:p="http://schemas.microsoft.com/office/2006/metadata/properties" xmlns:xsi="http://www.w3.org/2001/XMLSchema-instance" xmlns:pc="http://schemas.microsoft.com/office/infopath/2007/PartnerControls">
-  <documentManagement/>
-</p:properties>
-</file>
-
-<file path=customXml/item2.xml><?xml version="1.0" encoding="utf-8"?>
 <?mso-contentType ?>
 <FormTemplates xmlns="http://schemas.microsoft.com/sharepoint/v3/contenttype/forms">
   <Display>DocumentLibraryForm</Display>
@@ -49250,7 +49416,7 @@
 </FormTemplates>
 </file>
 
-<file path=customXml/item3.xml><?xml version="1.0" encoding="utf-8"?>
+<file path=customXml/item2.xml><?xml version="1.0" encoding="utf-8"?>
 <ct:contentTypeSchema xmlns:ct="http://schemas.microsoft.com/office/2006/metadata/contentType" xmlns:ma="http://schemas.microsoft.com/office/2006/metadata/properties/metaAttributes" ct:_="" ma:_="" ma:contentTypeName="Document" ma:contentTypeID="0x010100FC6CF817D1BF8443A925FA58DAFE0E03" ma:contentTypeVersion="8" ma:contentTypeDescription="Create a new document." ma:contentTypeScope="" ma:versionID="bd5337accebffad45f2b4b3a49fd9b23">
   <xsd:schema xmlns:xsd="http://www.w3.org/2001/XMLSchema" xmlns:xs="http://www.w3.org/2001/XMLSchema" xmlns:p="http://schemas.microsoft.com/office/2006/metadata/properties" xmlns:ns2="eebd306e-2a2f-4ca8-b802-29c7b81e93c1" targetNamespace="http://schemas.microsoft.com/office/2006/metadata/properties" ma:root="true" ma:fieldsID="a067789c4fcf74506c02d9a138478fcf" ns2:_="">
     <xsd:import namespace="eebd306e-2a2f-4ca8-b802-29c7b81e93c1"/>
@@ -49422,23 +49588,13 @@
 </ct:contentTypeSchema>
 </file>
 
-<file path=customXml/itemProps1.xml><?xml version="1.0" encoding="utf-8"?>
-<ds:datastoreItem xmlns:ds="http://schemas.openxmlformats.org/officeDocument/2006/customXml" ds:itemID="{264D3FE7-A0C8-4453-A806-BCAD6F53B901}">
-  <ds:schemaRefs>
-    <ds:schemaRef ds:uri="http://www.w3.org/XML/1998/namespace"/>
-    <ds:schemaRef ds:uri="http://schemas.openxmlformats.org/package/2006/metadata/core-properties"/>
-    <ds:schemaRef ds:uri="http://purl.org/dc/terms/"/>
-    <ds:schemaRef ds:uri="eebd306e-2a2f-4ca8-b802-29c7b81e93c1"/>
-    <ds:schemaRef ds:uri="http://purl.org/dc/elements/1.1/"/>
-    <ds:schemaRef ds:uri="http://schemas.microsoft.com/office/2006/documentManagement/types"/>
-    <ds:schemaRef ds:uri="http://schemas.microsoft.com/office/infopath/2007/PartnerControls"/>
-    <ds:schemaRef ds:uri="http://schemas.microsoft.com/office/2006/metadata/properties"/>
-    <ds:schemaRef ds:uri="http://purl.org/dc/dcmitype/"/>
-  </ds:schemaRefs>
-</ds:datastoreItem>
+<file path=customXml/item3.xml><?xml version="1.0" encoding="utf-8"?>
+<p:properties xmlns:p="http://schemas.microsoft.com/office/2006/metadata/properties" xmlns:xsi="http://www.w3.org/2001/XMLSchema-instance" xmlns:pc="http://schemas.microsoft.com/office/infopath/2007/PartnerControls">
+  <documentManagement/>
+</p:properties>
 </file>
 
-<file path=customXml/itemProps2.xml><?xml version="1.0" encoding="utf-8"?>
+<file path=customXml/itemProps1.xml><?xml version="1.0" encoding="utf-8"?>
 <ds:datastoreItem xmlns:ds="http://schemas.openxmlformats.org/officeDocument/2006/customXml" ds:itemID="{6CCB8030-6F99-446F-BD3B-E5E3F435F1FD}">
   <ds:schemaRefs>
     <ds:schemaRef ds:uri="http://schemas.microsoft.com/sharepoint/v3/contenttype/forms"/>
@@ -49446,7 +49602,7 @@
 </ds:datastoreItem>
 </file>
 
-<file path=customXml/itemProps3.xml><?xml version="1.0" encoding="utf-8"?>
+<file path=customXml/itemProps2.xml><?xml version="1.0" encoding="utf-8"?>
 <ds:datastoreItem xmlns:ds="http://schemas.openxmlformats.org/officeDocument/2006/customXml" ds:itemID="{CC3380C4-575D-45FB-8841-88BD9EC5828E}">
   <ds:schemaRefs>
     <ds:schemaRef ds:uri="eebd306e-2a2f-4ca8-b802-29c7b81e93c1"/>
@@ -49462,4 +49618,20 @@
     <ds:schemaRef ds:uri="http://www.w3.org/2001/XMLSchema"/>
   </ds:schemaRefs>
 </ds:datastoreItem>
+</file>
+
+<file path=customXml/itemProps3.xml><?xml version="1.0" encoding="utf-8"?>
+<ds:datastoreItem xmlns:ds="http://schemas.openxmlformats.org/officeDocument/2006/customXml" ds:itemID="{264D3FE7-A0C8-4453-A806-BCAD6F53B901}">
+  <ds:schemaRefs>
+    <ds:schemaRef ds:uri="http://www.w3.org/XML/1998/namespace"/>
+    <ds:schemaRef ds:uri="http://schemas.openxmlformats.org/package/2006/metadata/core-properties"/>
+    <ds:schemaRef ds:uri="http://purl.org/dc/terms/"/>
+    <ds:schemaRef ds:uri="eebd306e-2a2f-4ca8-b802-29c7b81e93c1"/>
+    <ds:schemaRef ds:uri="http://purl.org/dc/elements/1.1/"/>
+    <ds:schemaRef ds:uri="http://schemas.microsoft.com/office/2006/documentManagement/types"/>
+    <ds:schemaRef ds:uri="http://schemas.microsoft.com/office/infopath/2007/PartnerControls"/>
+    <ds:schemaRef ds:uri="http://schemas.microsoft.com/office/2006/metadata/properties"/>
+    <ds:schemaRef ds:uri="http://purl.org/dc/dcmitype/"/>
+  </ds:schemaRefs>
+</ds:datastoreItem>
 </file>
</xml_diff>